<commit_message>
add web site links
</commit_message>
<xml_diff>
--- a/CPP.pptx
+++ b/CPP.pptx
@@ -11,8 +11,9 @@
     <p:sldId id="259" r:id="rId5"/>
     <p:sldId id="260" r:id="rId6"/>
     <p:sldId id="261" r:id="rId7"/>
-    <p:sldId id="262" r:id="rId8"/>
-    <p:sldId id="263" r:id="rId9"/>
+    <p:sldId id="264" r:id="rId8"/>
+    <p:sldId id="262" r:id="rId9"/>
+    <p:sldId id="263" r:id="rId10"/>
   </p:sldIdLst>
   <p:sldSz cx="9144000" cy="6858000" type="screen4x3"/>
   <p:notesSz cx="6858000" cy="9144000"/>
@@ -111,6 +112,22 @@
       </a:defRPr>
     </a:lvl9pPr>
   </p:defaultTextStyle>
+  <p:extLst>
+    <p:ext uri="{EFAFB233-063F-42B5-8137-9DF3F51BA10A}">
+      <p15:sldGuideLst xmlns:p15="http://schemas.microsoft.com/office/powerpoint/2012/main">
+        <p15:guide id="1" orient="horz" pos="2160">
+          <p15:clr>
+            <a:srgbClr val="A4A3A4"/>
+          </p15:clr>
+        </p15:guide>
+        <p15:guide id="2" pos="2880">
+          <p15:clr>
+            <a:srgbClr val="A4A3A4"/>
+          </p15:clr>
+        </p15:guide>
+      </p15:sldGuideLst>
+    </p:ext>
+  </p:extLst>
 </p:presentation>
 </file>
 
@@ -152,10 +169,9 @@
           <a:lstStyle/>
           <a:p>
             <a:r>
-              <a:rPr lang="fr-FR" smtClean="0"/>
+              <a:rPr lang="fr-FR"/>
               <a:t>Cliquez pour modifier le style du titre</a:t>
             </a:r>
-            <a:endParaRPr lang="fr-FR"/>
           </a:p>
         </p:txBody>
       </p:sp>
@@ -271,10 +287,9 @@
           </a:lstStyle>
           <a:p>
             <a:r>
-              <a:rPr lang="fr-FR" smtClean="0"/>
+              <a:rPr lang="fr-FR"/>
               <a:t>Cliquez pour modifier le style des sous-titres du masque</a:t>
             </a:r>
-            <a:endParaRPr lang="fr-FR"/>
           </a:p>
         </p:txBody>
       </p:sp>
@@ -384,10 +399,9 @@
           <a:lstStyle/>
           <a:p>
             <a:r>
-              <a:rPr lang="fr-FR" smtClean="0"/>
+              <a:rPr lang="fr-FR"/>
               <a:t>Cliquez pour modifier le style du titre</a:t>
             </a:r>
-            <a:endParaRPr lang="fr-FR"/>
           </a:p>
         </p:txBody>
       </p:sp>
@@ -408,38 +422,37 @@
           <a:p>
             <a:pPr lvl="0"/>
             <a:r>
-              <a:rPr lang="fr-FR" smtClean="0"/>
+              <a:rPr lang="fr-FR"/>
               <a:t>Cliquez pour modifier les styles du texte du masque</a:t>
             </a:r>
           </a:p>
           <a:p>
             <a:pPr lvl="1"/>
             <a:r>
-              <a:rPr lang="fr-FR" smtClean="0"/>
+              <a:rPr lang="fr-FR"/>
               <a:t>Deuxième niveau</a:t>
             </a:r>
           </a:p>
           <a:p>
             <a:pPr lvl="2"/>
             <a:r>
-              <a:rPr lang="fr-FR" smtClean="0"/>
+              <a:rPr lang="fr-FR"/>
               <a:t>Troisième niveau</a:t>
             </a:r>
           </a:p>
           <a:p>
             <a:pPr lvl="3"/>
             <a:r>
-              <a:rPr lang="fr-FR" smtClean="0"/>
+              <a:rPr lang="fr-FR"/>
               <a:t>Quatrième niveau</a:t>
             </a:r>
           </a:p>
           <a:p>
             <a:pPr lvl="4"/>
             <a:r>
-              <a:rPr lang="fr-FR" smtClean="0"/>
+              <a:rPr lang="fr-FR"/>
               <a:t>Cinquième niveau</a:t>
             </a:r>
-            <a:endParaRPr lang="fr-FR"/>
           </a:p>
         </p:txBody>
       </p:sp>
@@ -554,10 +567,9 @@
           <a:lstStyle/>
           <a:p>
             <a:r>
-              <a:rPr lang="fr-FR" smtClean="0"/>
+              <a:rPr lang="fr-FR"/>
               <a:t>Cliquez pour modifier le style du titre</a:t>
             </a:r>
-            <a:endParaRPr lang="fr-FR"/>
           </a:p>
         </p:txBody>
       </p:sp>
@@ -583,38 +595,37 @@
           <a:p>
             <a:pPr lvl="0"/>
             <a:r>
-              <a:rPr lang="fr-FR" smtClean="0"/>
+              <a:rPr lang="fr-FR"/>
               <a:t>Cliquez pour modifier les styles du texte du masque</a:t>
             </a:r>
           </a:p>
           <a:p>
             <a:pPr lvl="1"/>
             <a:r>
-              <a:rPr lang="fr-FR" smtClean="0"/>
+              <a:rPr lang="fr-FR"/>
               <a:t>Deuxième niveau</a:t>
             </a:r>
           </a:p>
           <a:p>
             <a:pPr lvl="2"/>
             <a:r>
-              <a:rPr lang="fr-FR" smtClean="0"/>
+              <a:rPr lang="fr-FR"/>
               <a:t>Troisième niveau</a:t>
             </a:r>
           </a:p>
           <a:p>
             <a:pPr lvl="3"/>
             <a:r>
-              <a:rPr lang="fr-FR" smtClean="0"/>
+              <a:rPr lang="fr-FR"/>
               <a:t>Quatrième niveau</a:t>
             </a:r>
           </a:p>
           <a:p>
             <a:pPr lvl="4"/>
             <a:r>
-              <a:rPr lang="fr-FR" smtClean="0"/>
+              <a:rPr lang="fr-FR"/>
               <a:t>Cinquième niveau</a:t>
             </a:r>
-            <a:endParaRPr lang="fr-FR"/>
           </a:p>
         </p:txBody>
       </p:sp>
@@ -724,10 +735,9 @@
           <a:lstStyle/>
           <a:p>
             <a:r>
-              <a:rPr lang="fr-FR" smtClean="0"/>
+              <a:rPr lang="fr-FR"/>
               <a:t>Cliquez pour modifier le style du titre</a:t>
             </a:r>
-            <a:endParaRPr lang="fr-FR"/>
           </a:p>
         </p:txBody>
       </p:sp>
@@ -748,38 +758,37 @@
           <a:p>
             <a:pPr lvl="0"/>
             <a:r>
-              <a:rPr lang="fr-FR" smtClean="0"/>
+              <a:rPr lang="fr-FR"/>
               <a:t>Cliquez pour modifier les styles du texte du masque</a:t>
             </a:r>
           </a:p>
           <a:p>
             <a:pPr lvl="1"/>
             <a:r>
-              <a:rPr lang="fr-FR" smtClean="0"/>
+              <a:rPr lang="fr-FR"/>
               <a:t>Deuxième niveau</a:t>
             </a:r>
           </a:p>
           <a:p>
             <a:pPr lvl="2"/>
             <a:r>
-              <a:rPr lang="fr-FR" smtClean="0"/>
+              <a:rPr lang="fr-FR"/>
               <a:t>Troisième niveau</a:t>
             </a:r>
           </a:p>
           <a:p>
             <a:pPr lvl="3"/>
             <a:r>
-              <a:rPr lang="fr-FR" smtClean="0"/>
+              <a:rPr lang="fr-FR"/>
               <a:t>Quatrième niveau</a:t>
             </a:r>
           </a:p>
           <a:p>
             <a:pPr lvl="4"/>
             <a:r>
-              <a:rPr lang="fr-FR" smtClean="0"/>
+              <a:rPr lang="fr-FR"/>
               <a:t>Cinquième niveau</a:t>
             </a:r>
-            <a:endParaRPr lang="fr-FR"/>
           </a:p>
         </p:txBody>
       </p:sp>
@@ -898,10 +907,9 @@
           </a:lstStyle>
           <a:p>
             <a:r>
-              <a:rPr lang="fr-FR" smtClean="0"/>
+              <a:rPr lang="fr-FR"/>
               <a:t>Cliquez pour modifier le style du titre</a:t>
             </a:r>
-            <a:endParaRPr lang="fr-FR"/>
           </a:p>
         </p:txBody>
       </p:sp>
@@ -1018,7 +1026,7 @@
           <a:p>
             <a:pPr lvl="0"/>
             <a:r>
-              <a:rPr lang="fr-FR" smtClean="0"/>
+              <a:rPr lang="fr-FR"/>
               <a:t>Cliquez pour modifier les styles du texte du masque</a:t>
             </a:r>
           </a:p>
@@ -1130,10 +1138,9 @@
           <a:lstStyle/>
           <a:p>
             <a:r>
-              <a:rPr lang="fr-FR" smtClean="0"/>
+              <a:rPr lang="fr-FR"/>
               <a:t>Cliquez pour modifier le style du titre</a:t>
             </a:r>
-            <a:endParaRPr lang="fr-FR"/>
           </a:p>
         </p:txBody>
       </p:sp>
@@ -1187,38 +1194,37 @@
           <a:p>
             <a:pPr lvl="0"/>
             <a:r>
-              <a:rPr lang="fr-FR" smtClean="0"/>
+              <a:rPr lang="fr-FR"/>
               <a:t>Cliquez pour modifier les styles du texte du masque</a:t>
             </a:r>
           </a:p>
           <a:p>
             <a:pPr lvl="1"/>
             <a:r>
-              <a:rPr lang="fr-FR" smtClean="0"/>
+              <a:rPr lang="fr-FR"/>
               <a:t>Deuxième niveau</a:t>
             </a:r>
           </a:p>
           <a:p>
             <a:pPr lvl="2"/>
             <a:r>
-              <a:rPr lang="fr-FR" smtClean="0"/>
+              <a:rPr lang="fr-FR"/>
               <a:t>Troisième niveau</a:t>
             </a:r>
           </a:p>
           <a:p>
             <a:pPr lvl="3"/>
             <a:r>
-              <a:rPr lang="fr-FR" smtClean="0"/>
+              <a:rPr lang="fr-FR"/>
               <a:t>Quatrième niveau</a:t>
             </a:r>
           </a:p>
           <a:p>
             <a:pPr lvl="4"/>
             <a:r>
-              <a:rPr lang="fr-FR" smtClean="0"/>
+              <a:rPr lang="fr-FR"/>
               <a:t>Cinquième niveau</a:t>
             </a:r>
-            <a:endParaRPr lang="fr-FR"/>
           </a:p>
         </p:txBody>
       </p:sp>
@@ -1272,38 +1278,37 @@
           <a:p>
             <a:pPr lvl="0"/>
             <a:r>
-              <a:rPr lang="fr-FR" smtClean="0"/>
+              <a:rPr lang="fr-FR"/>
               <a:t>Cliquez pour modifier les styles du texte du masque</a:t>
             </a:r>
           </a:p>
           <a:p>
             <a:pPr lvl="1"/>
             <a:r>
-              <a:rPr lang="fr-FR" smtClean="0"/>
+              <a:rPr lang="fr-FR"/>
               <a:t>Deuxième niveau</a:t>
             </a:r>
           </a:p>
           <a:p>
             <a:pPr lvl="2"/>
             <a:r>
-              <a:rPr lang="fr-FR" smtClean="0"/>
+              <a:rPr lang="fr-FR"/>
               <a:t>Troisième niveau</a:t>
             </a:r>
           </a:p>
           <a:p>
             <a:pPr lvl="3"/>
             <a:r>
-              <a:rPr lang="fr-FR" smtClean="0"/>
+              <a:rPr lang="fr-FR"/>
               <a:t>Quatrième niveau</a:t>
             </a:r>
           </a:p>
           <a:p>
             <a:pPr lvl="4"/>
             <a:r>
-              <a:rPr lang="fr-FR" smtClean="0"/>
+              <a:rPr lang="fr-FR"/>
               <a:t>Cinquième niveau</a:t>
             </a:r>
-            <a:endParaRPr lang="fr-FR"/>
           </a:p>
         </p:txBody>
       </p:sp>
@@ -1417,10 +1422,9 @@
           </a:lstStyle>
           <a:p>
             <a:r>
-              <a:rPr lang="fr-FR" smtClean="0"/>
+              <a:rPr lang="fr-FR"/>
               <a:t>Cliquez pour modifier le style du titre</a:t>
             </a:r>
-            <a:endParaRPr lang="fr-FR"/>
           </a:p>
         </p:txBody>
       </p:sp>
@@ -1483,7 +1487,7 @@
           <a:p>
             <a:pPr lvl="0"/>
             <a:r>
-              <a:rPr lang="fr-FR" smtClean="0"/>
+              <a:rPr lang="fr-FR"/>
               <a:t>Cliquez pour modifier les styles du texte du masque</a:t>
             </a:r>
           </a:p>
@@ -1539,38 +1543,37 @@
           <a:p>
             <a:pPr lvl="0"/>
             <a:r>
-              <a:rPr lang="fr-FR" smtClean="0"/>
+              <a:rPr lang="fr-FR"/>
               <a:t>Cliquez pour modifier les styles du texte du masque</a:t>
             </a:r>
           </a:p>
           <a:p>
             <a:pPr lvl="1"/>
             <a:r>
-              <a:rPr lang="fr-FR" smtClean="0"/>
+              <a:rPr lang="fr-FR"/>
               <a:t>Deuxième niveau</a:t>
             </a:r>
           </a:p>
           <a:p>
             <a:pPr lvl="2"/>
             <a:r>
-              <a:rPr lang="fr-FR" smtClean="0"/>
+              <a:rPr lang="fr-FR"/>
               <a:t>Troisième niveau</a:t>
             </a:r>
           </a:p>
           <a:p>
             <a:pPr lvl="3"/>
             <a:r>
-              <a:rPr lang="fr-FR" smtClean="0"/>
+              <a:rPr lang="fr-FR"/>
               <a:t>Quatrième niveau</a:t>
             </a:r>
           </a:p>
           <a:p>
             <a:pPr lvl="4"/>
             <a:r>
-              <a:rPr lang="fr-FR" smtClean="0"/>
+              <a:rPr lang="fr-FR"/>
               <a:t>Cinquième niveau</a:t>
             </a:r>
-            <a:endParaRPr lang="fr-FR"/>
           </a:p>
         </p:txBody>
       </p:sp>
@@ -1633,7 +1636,7 @@
           <a:p>
             <a:pPr lvl="0"/>
             <a:r>
-              <a:rPr lang="fr-FR" smtClean="0"/>
+              <a:rPr lang="fr-FR"/>
               <a:t>Cliquez pour modifier les styles du texte du masque</a:t>
             </a:r>
           </a:p>
@@ -1689,38 +1692,37 @@
           <a:p>
             <a:pPr lvl="0"/>
             <a:r>
-              <a:rPr lang="fr-FR" smtClean="0"/>
+              <a:rPr lang="fr-FR"/>
               <a:t>Cliquez pour modifier les styles du texte du masque</a:t>
             </a:r>
           </a:p>
           <a:p>
             <a:pPr lvl="1"/>
             <a:r>
-              <a:rPr lang="fr-FR" smtClean="0"/>
+              <a:rPr lang="fr-FR"/>
               <a:t>Deuxième niveau</a:t>
             </a:r>
           </a:p>
           <a:p>
             <a:pPr lvl="2"/>
             <a:r>
-              <a:rPr lang="fr-FR" smtClean="0"/>
+              <a:rPr lang="fr-FR"/>
               <a:t>Troisième niveau</a:t>
             </a:r>
           </a:p>
           <a:p>
             <a:pPr lvl="3"/>
             <a:r>
-              <a:rPr lang="fr-FR" smtClean="0"/>
+              <a:rPr lang="fr-FR"/>
               <a:t>Quatrième niveau</a:t>
             </a:r>
           </a:p>
           <a:p>
             <a:pPr lvl="4"/>
             <a:r>
-              <a:rPr lang="fr-FR" smtClean="0"/>
+              <a:rPr lang="fr-FR"/>
               <a:t>Cinquième niveau</a:t>
             </a:r>
-            <a:endParaRPr lang="fr-FR"/>
           </a:p>
         </p:txBody>
       </p:sp>
@@ -1830,10 +1832,9 @@
           <a:lstStyle/>
           <a:p>
             <a:r>
-              <a:rPr lang="fr-FR" smtClean="0"/>
+              <a:rPr lang="fr-FR"/>
               <a:t>Cliquez pour modifier le style du titre</a:t>
             </a:r>
-            <a:endParaRPr lang="fr-FR"/>
           </a:p>
         </p:txBody>
       </p:sp>
@@ -2042,10 +2043,9 @@
           </a:lstStyle>
           <a:p>
             <a:r>
-              <a:rPr lang="fr-FR" smtClean="0"/>
+              <a:rPr lang="fr-FR"/>
               <a:t>Cliquez pour modifier le style du titre</a:t>
             </a:r>
-            <a:endParaRPr lang="fr-FR"/>
           </a:p>
         </p:txBody>
       </p:sp>
@@ -2099,38 +2099,37 @@
           <a:p>
             <a:pPr lvl="0"/>
             <a:r>
-              <a:rPr lang="fr-FR" smtClean="0"/>
+              <a:rPr lang="fr-FR"/>
               <a:t>Cliquez pour modifier les styles du texte du masque</a:t>
             </a:r>
           </a:p>
           <a:p>
             <a:pPr lvl="1"/>
             <a:r>
-              <a:rPr lang="fr-FR" smtClean="0"/>
+              <a:rPr lang="fr-FR"/>
               <a:t>Deuxième niveau</a:t>
             </a:r>
           </a:p>
           <a:p>
             <a:pPr lvl="2"/>
             <a:r>
-              <a:rPr lang="fr-FR" smtClean="0"/>
+              <a:rPr lang="fr-FR"/>
               <a:t>Troisième niveau</a:t>
             </a:r>
           </a:p>
           <a:p>
             <a:pPr lvl="3"/>
             <a:r>
-              <a:rPr lang="fr-FR" smtClean="0"/>
+              <a:rPr lang="fr-FR"/>
               <a:t>Quatrième niveau</a:t>
             </a:r>
           </a:p>
           <a:p>
             <a:pPr lvl="4"/>
             <a:r>
-              <a:rPr lang="fr-FR" smtClean="0"/>
+              <a:rPr lang="fr-FR"/>
               <a:t>Cinquième niveau</a:t>
             </a:r>
-            <a:endParaRPr lang="fr-FR"/>
           </a:p>
         </p:txBody>
       </p:sp>
@@ -2193,7 +2192,7 @@
           <a:p>
             <a:pPr lvl="0"/>
             <a:r>
-              <a:rPr lang="fr-FR" smtClean="0"/>
+              <a:rPr lang="fr-FR"/>
               <a:t>Cliquez pour modifier les styles du texte du masque</a:t>
             </a:r>
           </a:p>
@@ -2314,10 +2313,9 @@
           </a:lstStyle>
           <a:p>
             <a:r>
-              <a:rPr lang="fr-FR" smtClean="0"/>
+              <a:rPr lang="fr-FR"/>
               <a:t>Cliquez pour modifier le style du titre</a:t>
             </a:r>
-            <a:endParaRPr lang="fr-FR"/>
           </a:p>
         </p:txBody>
       </p:sp>
@@ -2441,7 +2439,7 @@
           <a:p>
             <a:pPr lvl="0"/>
             <a:r>
-              <a:rPr lang="fr-FR" smtClean="0"/>
+              <a:rPr lang="fr-FR"/>
               <a:t>Cliquez pour modifier les styles du texte du masque</a:t>
             </a:r>
           </a:p>
@@ -2568,10 +2566,9 @@
           <a:lstStyle/>
           <a:p>
             <a:r>
-              <a:rPr lang="fr-FR" smtClean="0"/>
+              <a:rPr lang="fr-FR"/>
               <a:t>Cliquez pour modifier le style du titre</a:t>
             </a:r>
-            <a:endParaRPr lang="fr-FR"/>
           </a:p>
         </p:txBody>
       </p:sp>
@@ -2602,38 +2599,37 @@
           <a:p>
             <a:pPr lvl="0"/>
             <a:r>
-              <a:rPr lang="fr-FR" smtClean="0"/>
+              <a:rPr lang="fr-FR"/>
               <a:t>Cliquez pour modifier les styles du texte du masque</a:t>
             </a:r>
           </a:p>
           <a:p>
             <a:pPr lvl="1"/>
             <a:r>
-              <a:rPr lang="fr-FR" smtClean="0"/>
+              <a:rPr lang="fr-FR"/>
               <a:t>Deuxième niveau</a:t>
             </a:r>
           </a:p>
           <a:p>
             <a:pPr lvl="2"/>
             <a:r>
-              <a:rPr lang="fr-FR" smtClean="0"/>
+              <a:rPr lang="fr-FR"/>
               <a:t>Troisième niveau</a:t>
             </a:r>
           </a:p>
           <a:p>
             <a:pPr lvl="3"/>
             <a:r>
-              <a:rPr lang="fr-FR" smtClean="0"/>
+              <a:rPr lang="fr-FR"/>
               <a:t>Quatrième niveau</a:t>
             </a:r>
           </a:p>
           <a:p>
             <a:pPr lvl="4"/>
             <a:r>
-              <a:rPr lang="fr-FR" smtClean="0"/>
+              <a:rPr lang="fr-FR"/>
               <a:t>Cinquième niveau</a:t>
             </a:r>
-            <a:endParaRPr lang="fr-FR"/>
           </a:p>
         </p:txBody>
       </p:sp>
@@ -3058,10 +3054,9 @@
           <a:lstStyle/>
           <a:p>
             <a:r>
-              <a:rPr lang="fr-FR" dirty="0" smtClean="0"/>
+              <a:rPr lang="fr-FR" dirty="0"/>
               <a:t>C++</a:t>
             </a:r>
-            <a:endParaRPr lang="fr-FR" dirty="0"/>
           </a:p>
         </p:txBody>
       </p:sp>
@@ -3081,27 +3076,22 @@
           <a:lstStyle/>
           <a:p>
             <a:r>
-              <a:rPr lang="fr-FR" dirty="0" smtClean="0">
+              <a:rPr lang="fr-FR" dirty="0">
                 <a:hlinkClick r:id="rId2"/>
               </a:rPr>
               <a:t>matthias.colin@gmail.com</a:t>
             </a:r>
-            <a:endParaRPr lang="fr-FR" dirty="0" smtClean="0"/>
-          </a:p>
-          <a:p>
-            <a:r>
-              <a:rPr lang="fr-FR" dirty="0" err="1"/>
-              <a:t>j</a:t>
-            </a:r>
-            <a:r>
-              <a:rPr lang="fr-FR" dirty="0" err="1" smtClean="0"/>
-              <a:t>uly</a:t>
-            </a:r>
-            <a:r>
-              <a:rPr lang="fr-FR" dirty="0" smtClean="0"/>
+            <a:endParaRPr lang="fr-FR" dirty="0"/>
+          </a:p>
+          <a:p>
+            <a:r>
+              <a:rPr lang="fr-FR" dirty="0" err="1"/>
+              <a:t>july</a:t>
+            </a:r>
+            <a:r>
+              <a:rPr lang="fr-FR" dirty="0"/>
               <a:t> 2019</a:t>
             </a:r>
-            <a:endParaRPr lang="fr-FR" dirty="0"/>
           </a:p>
         </p:txBody>
       </p:sp>
@@ -3146,7 +3136,7 @@
           <a:lstStyle/>
           <a:p>
             <a:r>
-              <a:rPr lang="fr-FR" dirty="0" err="1" smtClean="0"/>
+              <a:rPr lang="fr-FR" dirty="0" err="1"/>
               <a:t>Summary</a:t>
             </a:r>
             <a:endParaRPr lang="fr-FR" dirty="0"/>
@@ -3169,64 +3159,63 @@
           <a:lstStyle/>
           <a:p>
             <a:r>
-              <a:rPr lang="fr-FR" dirty="0" err="1" smtClean="0"/>
+              <a:rPr lang="fr-FR" dirty="0" err="1"/>
               <a:t>History</a:t>
             </a:r>
-            <a:endParaRPr lang="fr-FR" dirty="0" smtClean="0"/>
-          </a:p>
-          <a:p>
-            <a:r>
-              <a:rPr lang="fr-FR" dirty="0" smtClean="0"/>
+            <a:endParaRPr lang="fr-FR" dirty="0"/>
+          </a:p>
+          <a:p>
+            <a:r>
+              <a:rPr lang="fr-FR" dirty="0"/>
               <a:t>Basics</a:t>
             </a:r>
           </a:p>
           <a:p>
             <a:r>
-              <a:rPr lang="fr-FR" dirty="0" smtClean="0"/>
+              <a:rPr lang="fr-FR" dirty="0"/>
               <a:t>Object </a:t>
             </a:r>
             <a:r>
-              <a:rPr lang="fr-FR" dirty="0" err="1" smtClean="0"/>
+              <a:rPr lang="fr-FR" dirty="0" err="1"/>
               <a:t>Oriented</a:t>
             </a:r>
             <a:r>
-              <a:rPr lang="fr-FR" dirty="0" smtClean="0"/>
+              <a:rPr lang="fr-FR" dirty="0"/>
               <a:t> </a:t>
             </a:r>
             <a:r>
-              <a:rPr lang="fr-FR" dirty="0" err="1" smtClean="0"/>
+              <a:rPr lang="fr-FR" dirty="0" err="1"/>
               <a:t>Programming</a:t>
             </a:r>
-            <a:endParaRPr lang="fr-FR" dirty="0" smtClean="0"/>
-          </a:p>
-          <a:p>
-            <a:r>
-              <a:rPr lang="fr-FR" dirty="0" err="1" smtClean="0"/>
+            <a:endParaRPr lang="fr-FR" dirty="0"/>
+          </a:p>
+          <a:p>
+            <a:r>
+              <a:rPr lang="fr-FR" dirty="0" err="1"/>
               <a:t>Templates</a:t>
             </a:r>
-            <a:endParaRPr lang="fr-FR" dirty="0" smtClean="0"/>
-          </a:p>
-          <a:p>
-            <a:r>
-              <a:rPr lang="fr-FR" dirty="0" err="1" smtClean="0"/>
+            <a:endParaRPr lang="fr-FR" dirty="0"/>
+          </a:p>
+          <a:p>
+            <a:r>
+              <a:rPr lang="fr-FR" dirty="0" err="1"/>
               <a:t>Functional</a:t>
             </a:r>
             <a:r>
-              <a:rPr lang="fr-FR" dirty="0" smtClean="0"/>
+              <a:rPr lang="fr-FR" dirty="0"/>
               <a:t> </a:t>
             </a:r>
             <a:r>
-              <a:rPr lang="fr-FR" dirty="0" err="1" smtClean="0"/>
+              <a:rPr lang="fr-FR" dirty="0" err="1"/>
               <a:t>Programming</a:t>
             </a:r>
-            <a:endParaRPr lang="fr-FR" dirty="0" smtClean="0"/>
-          </a:p>
-          <a:p>
-            <a:r>
-              <a:rPr lang="fr-FR" dirty="0" smtClean="0"/>
+            <a:endParaRPr lang="fr-FR" dirty="0"/>
+          </a:p>
+          <a:p>
+            <a:r>
+              <a:rPr lang="fr-FR" dirty="0"/>
               <a:t>Multi-threadings</a:t>
             </a:r>
-            <a:endParaRPr lang="fr-FR" dirty="0"/>
           </a:p>
         </p:txBody>
       </p:sp>
@@ -3271,11 +3260,11 @@
           <a:lstStyle/>
           <a:p>
             <a:r>
-              <a:rPr lang="fr-FR" dirty="0" smtClean="0"/>
+              <a:rPr lang="fr-FR" dirty="0"/>
               <a:t>C++ </a:t>
             </a:r>
             <a:r>
-              <a:rPr lang="fr-FR" dirty="0" err="1" smtClean="0"/>
+              <a:rPr lang="fr-FR" dirty="0" err="1"/>
               <a:t>History</a:t>
             </a:r>
             <a:endParaRPr lang="fr-FR" dirty="0"/>
@@ -3305,71 +3294,71 @@
           <a:lstStyle/>
           <a:p>
             <a:r>
-              <a:rPr lang="fr-FR" dirty="0" smtClean="0"/>
+              <a:rPr lang="fr-FR" dirty="0"/>
               <a:t>1972 : C by Dennis Ritchie and Ken Thompson</a:t>
             </a:r>
           </a:p>
           <a:p>
             <a:r>
-              <a:rPr lang="fr-FR" dirty="0" smtClean="0"/>
+              <a:rPr lang="fr-FR" dirty="0"/>
               <a:t>1979 : C </a:t>
             </a:r>
             <a:r>
-              <a:rPr lang="fr-FR" dirty="0" err="1" smtClean="0"/>
+              <a:rPr lang="fr-FR" dirty="0" err="1"/>
               <a:t>with</a:t>
             </a:r>
             <a:r>
-              <a:rPr lang="fr-FR" dirty="0" smtClean="0"/>
+              <a:rPr lang="fr-FR" dirty="0"/>
               <a:t> classes by Bjarne </a:t>
             </a:r>
             <a:r>
-              <a:rPr lang="fr-FR" dirty="0" err="1" smtClean="0"/>
+              <a:rPr lang="fr-FR" dirty="0" err="1"/>
               <a:t>Stroustrup</a:t>
             </a:r>
-            <a:endParaRPr lang="fr-FR" dirty="0" smtClean="0"/>
+            <a:endParaRPr lang="fr-FR" dirty="0"/>
           </a:p>
           <a:p>
             <a:pPr lvl="1">
               <a:buNone/>
             </a:pPr>
             <a:r>
-              <a:rPr lang="fr-FR" dirty="0" smtClean="0"/>
+              <a:rPr lang="fr-FR" dirty="0"/>
               <a:t>				AT&amp;T Bell </a:t>
             </a:r>
             <a:r>
-              <a:rPr lang="fr-FR" dirty="0" err="1" smtClean="0"/>
+              <a:rPr lang="fr-FR" dirty="0" err="1"/>
               <a:t>Labs</a:t>
             </a:r>
-            <a:endParaRPr lang="fr-FR" dirty="0" smtClean="0"/>
-          </a:p>
-          <a:p>
-            <a:r>
-              <a:rPr lang="fr-FR" dirty="0" smtClean="0"/>
+            <a:endParaRPr lang="fr-FR" dirty="0"/>
+          </a:p>
+          <a:p>
+            <a:r>
+              <a:rPr lang="fr-FR" dirty="0"/>
               <a:t>1983 : C++</a:t>
             </a:r>
           </a:p>
           <a:p>
             <a:r>
-              <a:rPr lang="fr-FR" dirty="0" smtClean="0"/>
+              <a:rPr lang="fr-FR" dirty="0"/>
               <a:t>1985 : The C++ </a:t>
             </a:r>
             <a:r>
-              <a:rPr lang="fr-FR" dirty="0" err="1" smtClean="0"/>
+              <a:rPr lang="fr-FR" dirty="0" err="1"/>
               <a:t>Programming</a:t>
             </a:r>
             <a:r>
-              <a:rPr lang="fr-FR" dirty="0" smtClean="0"/>
+              <a:rPr lang="fr-FR" dirty="0"/>
               <a:t> </a:t>
             </a:r>
             <a:r>
-              <a:rPr lang="fr-FR" dirty="0" err="1" smtClean="0"/>
+              <a:rPr lang="fr-FR" dirty="0" err="1"/>
               <a:t>Language</a:t>
             </a:r>
-            <a:endParaRPr lang="fr-FR" dirty="0" smtClean="0"/>
-          </a:p>
-          <a:p>
-            <a:r>
-              <a:rPr lang="fr-FR" dirty="0" smtClean="0"/>
+            <a:endParaRPr lang="fr-FR" dirty="0"/>
+          </a:p>
+          <a:p>
+            <a:r>
+              <a:rPr lang="fr-FR" dirty="0"/>
               <a:t>1989 : C++ 2.0</a:t>
             </a:r>
           </a:p>
@@ -3378,84 +3367,83 @@
               <a:buNone/>
             </a:pPr>
             <a:r>
-              <a:rPr lang="fr-FR" dirty="0" smtClean="0"/>
+              <a:rPr lang="fr-FR" dirty="0"/>
               <a:t>	The C++ </a:t>
             </a:r>
             <a:r>
-              <a:rPr lang="fr-FR" dirty="0" err="1" smtClean="0"/>
+              <a:rPr lang="fr-FR" dirty="0" err="1"/>
               <a:t>Programming</a:t>
             </a:r>
             <a:r>
-              <a:rPr lang="fr-FR" dirty="0" smtClean="0"/>
+              <a:rPr lang="fr-FR" dirty="0"/>
               <a:t> </a:t>
             </a:r>
             <a:r>
-              <a:rPr lang="fr-FR" dirty="0" err="1" smtClean="0"/>
+              <a:rPr lang="fr-FR" dirty="0" err="1"/>
               <a:t>Language</a:t>
             </a:r>
             <a:r>
-              <a:rPr lang="fr-FR" dirty="0" smtClean="0"/>
+              <a:rPr lang="fr-FR" dirty="0"/>
               <a:t>, 2</a:t>
             </a:r>
             <a:r>
-              <a:rPr lang="fr-FR" baseline="30000" dirty="0" smtClean="0"/>
+              <a:rPr lang="fr-FR" baseline="30000" dirty="0"/>
               <a:t>nd</a:t>
             </a:r>
             <a:r>
-              <a:rPr lang="fr-FR" dirty="0" smtClean="0"/>
+              <a:rPr lang="fr-FR" dirty="0"/>
               <a:t> Edition</a:t>
             </a:r>
-            <a:endParaRPr lang="fr-FR" dirty="0" smtClean="0"/>
-          </a:p>
-          <a:p>
-            <a:r>
-              <a:rPr lang="fr-FR" dirty="0" smtClean="0"/>
+          </a:p>
+          <a:p>
+            <a:r>
+              <a:rPr lang="fr-FR" dirty="0"/>
               <a:t>1990 : The </a:t>
             </a:r>
             <a:r>
-              <a:rPr lang="fr-FR" dirty="0" err="1" smtClean="0"/>
+              <a:rPr lang="fr-FR" dirty="0" err="1"/>
               <a:t>Annotated</a:t>
             </a:r>
             <a:r>
-              <a:rPr lang="fr-FR" dirty="0" smtClean="0"/>
+              <a:rPr lang="fr-FR" dirty="0"/>
               <a:t> C++ </a:t>
             </a:r>
             <a:r>
-              <a:rPr lang="fr-FR" dirty="0" err="1" smtClean="0"/>
+              <a:rPr lang="fr-FR" dirty="0" err="1"/>
               <a:t>Reference</a:t>
             </a:r>
             <a:r>
-              <a:rPr lang="fr-FR" dirty="0" smtClean="0"/>
+              <a:rPr lang="fr-FR" dirty="0"/>
               <a:t> </a:t>
             </a:r>
             <a:r>
-              <a:rPr lang="fr-FR" dirty="0" err="1" smtClean="0"/>
+              <a:rPr lang="fr-FR" dirty="0" err="1"/>
               <a:t>Manual</a:t>
             </a:r>
-            <a:endParaRPr lang="fr-FR" dirty="0" smtClean="0"/>
-          </a:p>
-          <a:p>
-            <a:r>
-              <a:rPr lang="fr-FR" dirty="0" smtClean="0"/>
+            <a:endParaRPr lang="fr-FR" dirty="0"/>
+          </a:p>
+          <a:p>
+            <a:r>
+              <a:rPr lang="fr-FR" dirty="0"/>
               <a:t>1994 : Standard Template Library (STL)</a:t>
             </a:r>
           </a:p>
           <a:p>
             <a:r>
-              <a:rPr lang="fr-FR" dirty="0" smtClean="0"/>
+              <a:rPr lang="fr-FR" dirty="0"/>
               <a:t>1998 : C++98, 1</a:t>
             </a:r>
             <a:r>
-              <a:rPr lang="fr-FR" baseline="30000" dirty="0" smtClean="0"/>
+              <a:rPr lang="fr-FR" baseline="30000" dirty="0"/>
               <a:t>st</a:t>
             </a:r>
             <a:r>
-              <a:rPr lang="fr-FR" dirty="0" smtClean="0"/>
+              <a:rPr lang="fr-FR" dirty="0"/>
               <a:t> standard</a:t>
             </a:r>
           </a:p>
           <a:p>
-            <a:endParaRPr lang="fr-FR" dirty="0" smtClean="0"/>
+            <a:endParaRPr lang="fr-FR" dirty="0"/>
           </a:p>
         </p:txBody>
       </p:sp>
@@ -3500,11 +3488,11 @@
           <a:lstStyle/>
           <a:p>
             <a:r>
-              <a:rPr lang="fr-FR" dirty="0" smtClean="0"/>
+              <a:rPr lang="fr-FR" dirty="0"/>
               <a:t>C++ </a:t>
             </a:r>
             <a:r>
-              <a:rPr lang="fr-FR" dirty="0" err="1" smtClean="0"/>
+              <a:rPr lang="fr-FR" dirty="0" err="1"/>
               <a:t>History</a:t>
             </a:r>
             <a:endParaRPr lang="fr-FR" dirty="0"/>
@@ -3529,89 +3517,73 @@
           <a:lstStyle/>
           <a:p>
             <a:r>
-              <a:rPr lang="fr-FR" dirty="0" smtClean="0"/>
+              <a:rPr lang="fr-FR" dirty="0"/>
               <a:t>Standards :</a:t>
             </a:r>
           </a:p>
           <a:p>
             <a:pPr lvl="1"/>
             <a:r>
-              <a:rPr lang="fr-FR" dirty="0" smtClean="0"/>
+              <a:rPr lang="fr-FR" dirty="0"/>
               <a:t>1998 : ISO/IEC 14882:1998 ; C++98	</a:t>
             </a:r>
           </a:p>
           <a:p>
             <a:pPr lvl="1"/>
             <a:r>
-              <a:rPr lang="fr-FR" dirty="0" smtClean="0"/>
+              <a:rPr lang="fr-FR" dirty="0"/>
               <a:t>2003 : ISO/IEC 14882:2003 ; C++03 (98 bug </a:t>
             </a:r>
             <a:r>
-              <a:rPr lang="fr-FR" dirty="0" err="1" smtClean="0"/>
+              <a:rPr lang="fr-FR" dirty="0" err="1"/>
               <a:t>fix</a:t>
             </a:r>
             <a:r>
-              <a:rPr lang="fr-FR" dirty="0" smtClean="0"/>
+              <a:rPr lang="fr-FR" dirty="0"/>
               <a:t>)</a:t>
             </a:r>
           </a:p>
           <a:p>
             <a:pPr lvl="1"/>
             <a:r>
-              <a:rPr lang="fr-FR" dirty="0" smtClean="0"/>
+              <a:rPr lang="fr-FR" dirty="0"/>
               <a:t>2011 : ISO/IEC 14882:2011 ; C++11, C++0x</a:t>
             </a:r>
           </a:p>
           <a:p>
             <a:pPr lvl="1"/>
             <a:r>
-              <a:rPr lang="fr-FR" dirty="0" smtClean="0"/>
-              <a:t>2014 : </a:t>
-            </a:r>
-            <a:r>
-              <a:rPr lang="fr-FR" dirty="0"/>
-              <a:t>ISO/IEC </a:t>
-            </a:r>
-            <a:r>
-              <a:rPr lang="fr-FR" dirty="0" smtClean="0"/>
-              <a:t>14882:2014 ; C++14, C++1y</a:t>
+              <a:rPr lang="fr-FR" dirty="0"/>
+              <a:t>2014 : ISO/IEC 14882:2014 ; C++14, C++1y</a:t>
             </a:r>
           </a:p>
           <a:p>
             <a:pPr lvl="1"/>
             <a:r>
-              <a:rPr lang="fr-FR" dirty="0" smtClean="0"/>
-              <a:t>2017 : </a:t>
-            </a:r>
-            <a:r>
-              <a:rPr lang="fr-FR" dirty="0"/>
-              <a:t>ISO/IEC </a:t>
-            </a:r>
-            <a:r>
-              <a:rPr lang="fr-FR" dirty="0" smtClean="0"/>
-              <a:t>14882:2017 ; C++17, C++1z</a:t>
+              <a:rPr lang="fr-FR" dirty="0"/>
+              <a:t>2017 : ISO/IEC 14882:2017 ; C++17, C++1z</a:t>
             </a:r>
           </a:p>
           <a:p>
             <a:pPr lvl="1"/>
             <a:r>
-              <a:rPr lang="fr-FR" dirty="0" smtClean="0"/>
+              <a:rPr lang="fr-FR" dirty="0"/>
               <a:t>2020 : to </a:t>
             </a:r>
             <a:r>
-              <a:rPr lang="fr-FR" dirty="0" err="1" smtClean="0"/>
+              <a:rPr lang="fr-FR" dirty="0" err="1"/>
               <a:t>be</a:t>
             </a:r>
             <a:r>
-              <a:rPr lang="fr-FR" dirty="0" smtClean="0"/>
+              <a:rPr lang="fr-FR" dirty="0"/>
               <a:t> </a:t>
             </a:r>
             <a:r>
-              <a:rPr lang="fr-FR" dirty="0" err="1" smtClean="0"/>
+              <a:rPr lang="fr-FR" dirty="0" err="1"/>
               <a:t>determined</a:t>
             </a:r>
             <a:r>
-              <a:rPr lang="fr-FR" dirty="0" smtClean="0"/>
+              <a:rPr lang="fr-FR" dirty="0"/>
               <a:t> ; C++20, C++2a	</a:t>
             </a:r>
           </a:p>
@@ -3658,10 +3630,9 @@
           <a:lstStyle/>
           <a:p>
             <a:r>
-              <a:rPr lang="fr-FR" dirty="0" smtClean="0"/>
+              <a:rPr lang="fr-FR" dirty="0"/>
               <a:t>Microsoft Visual C++</a:t>
             </a:r>
-            <a:endParaRPr lang="fr-FR" dirty="0" smtClean="0"/>
           </a:p>
         </p:txBody>
       </p:sp>
@@ -3688,21 +3659,21 @@
           <a:lstStyle/>
           <a:p>
             <a:r>
-              <a:rPr lang="fr-FR" dirty="0" smtClean="0"/>
+              <a:rPr lang="fr-FR" dirty="0"/>
               <a:t>1989 : C 6.0 </a:t>
             </a:r>
             <a:r>
-              <a:rPr lang="fr-FR" dirty="0" err="1" smtClean="0"/>
+              <a:rPr lang="fr-FR" dirty="0" err="1"/>
               <a:t>included</a:t>
             </a:r>
             <a:r>
-              <a:rPr lang="fr-FR" dirty="0" smtClean="0"/>
+              <a:rPr lang="fr-FR" dirty="0"/>
               <a:t> C++ front end</a:t>
             </a:r>
           </a:p>
           <a:p>
             <a:r>
-              <a:rPr lang="fr-FR" dirty="0" smtClean="0"/>
+              <a:rPr lang="fr-FR" dirty="0"/>
               <a:t>1992 : C/C++ 7.0</a:t>
             </a:r>
           </a:p>
@@ -3712,38 +3683,34 @@
             </a:pPr>
             <a:r>
               <a:rPr lang="fr-FR" dirty="0"/>
-              <a:t>	</a:t>
-            </a:r>
-            <a:r>
-              <a:rPr lang="fr-FR" dirty="0" smtClean="0"/>
-              <a:t>	Microsoft </a:t>
-            </a:r>
-            <a:r>
-              <a:rPr lang="fr-FR" dirty="0" err="1" smtClean="0"/>
+              <a:t>		Microsoft </a:t>
+            </a:r>
+            <a:r>
+              <a:rPr lang="fr-FR" dirty="0" err="1"/>
               <a:t>Foundation</a:t>
             </a:r>
             <a:r>
-              <a:rPr lang="fr-FR" dirty="0" smtClean="0"/>
+              <a:rPr lang="fr-FR" dirty="0"/>
               <a:t> Class Library (MFC)</a:t>
             </a:r>
           </a:p>
           <a:p>
             <a:r>
-              <a:rPr lang="fr-FR" dirty="0" smtClean="0"/>
+              <a:rPr lang="fr-FR" dirty="0"/>
               <a:t>1993 : Visual C++ 1.0 </a:t>
             </a:r>
             <a:r>
-              <a:rPr lang="fr-FR" dirty="0" err="1" smtClean="0"/>
+              <a:rPr lang="fr-FR" dirty="0" err="1"/>
               <a:t>with</a:t>
             </a:r>
             <a:r>
-              <a:rPr lang="fr-FR" dirty="0" smtClean="0"/>
+              <a:rPr lang="fr-FR" dirty="0"/>
               <a:t> MFC 2.0</a:t>
             </a:r>
           </a:p>
           <a:p>
             <a:r>
-              <a:rPr lang="fr-FR" dirty="0" smtClean="0"/>
+              <a:rPr lang="fr-FR" dirty="0"/>
               <a:t>1998 : Visual C++ 6.0 / MFC 6.0</a:t>
             </a:r>
           </a:p>
@@ -3753,28 +3720,24 @@
             </a:pPr>
             <a:r>
               <a:rPr lang="fr-FR" dirty="0"/>
-              <a:t>	</a:t>
-            </a:r>
-            <a:r>
-              <a:rPr lang="fr-FR" dirty="0" smtClean="0"/>
-              <a:t>		…</a:t>
-            </a:r>
-          </a:p>
-          <a:p>
-            <a:r>
-              <a:rPr lang="fr-FR" dirty="0" smtClean="0"/>
+              <a:t>			…</a:t>
+            </a:r>
+          </a:p>
+          <a:p>
+            <a:r>
+              <a:rPr lang="fr-FR" dirty="0"/>
               <a:t>2015 : Visual C++ 2015 (C++ 14.0)</a:t>
             </a:r>
           </a:p>
           <a:p>
             <a:r>
-              <a:rPr lang="fr-FR" dirty="0" smtClean="0"/>
+              <a:rPr lang="fr-FR" dirty="0"/>
               <a:t>2017 : Visual C++ 2017 (C++ 14.1)</a:t>
             </a:r>
           </a:p>
           <a:p>
             <a:r>
-              <a:rPr lang="fr-FR" dirty="0" smtClean="0"/>
+              <a:rPr lang="fr-FR" dirty="0"/>
               <a:t>2019 : Visual C++ 2019 (C++ 14.2)</a:t>
             </a:r>
           </a:p>
@@ -3786,30 +3749,21 @@
               <a:buNone/>
             </a:pPr>
             <a:r>
-              <a:rPr lang="fr-FR" dirty="0" err="1" smtClean="0"/>
+              <a:rPr lang="fr-FR" dirty="0" err="1"/>
               <a:t>Each</a:t>
             </a:r>
             <a:r>
-              <a:rPr lang="fr-FR" dirty="0" smtClean="0"/>
+              <a:rPr lang="fr-FR" dirty="0"/>
               <a:t> version : </a:t>
             </a:r>
             <a:r>
-              <a:rPr lang="fr-FR" dirty="0" err="1" smtClean="0"/>
+              <a:rPr lang="fr-FR" dirty="0" err="1"/>
               <a:t>improved</a:t>
             </a:r>
             <a:r>
-              <a:rPr lang="fr-FR" dirty="0" smtClean="0"/>
-              <a:t> </a:t>
-            </a:r>
-            <a:r>
-              <a:rPr lang="fr-FR" dirty="0"/>
-              <a:t>C++11/14/17 </a:t>
-            </a:r>
-            <a:r>
-              <a:rPr lang="fr-FR" dirty="0" smtClean="0"/>
-              <a:t>support</a:t>
-            </a:r>
-            <a:endParaRPr lang="fr-FR" dirty="0"/>
+              <a:rPr lang="fr-FR" dirty="0"/>
+              <a:t> C++11/14/17 support</a:t>
+            </a:r>
           </a:p>
         </p:txBody>
       </p:sp>
@@ -3854,10 +3808,9 @@
           <a:lstStyle/>
           <a:p>
             <a:r>
-              <a:rPr lang="fr-FR" dirty="0" smtClean="0"/>
+              <a:rPr lang="fr-FR" dirty="0"/>
               <a:t>GNU C++ Compiler</a:t>
             </a:r>
-            <a:endParaRPr lang="fr-FR" dirty="0"/>
           </a:p>
         </p:txBody>
       </p:sp>
@@ -3880,97 +3833,97 @@
               <a:buNone/>
             </a:pPr>
             <a:r>
-              <a:rPr lang="fr-FR" dirty="0" smtClean="0"/>
+              <a:rPr lang="fr-FR" dirty="0"/>
               <a:t>Richard </a:t>
             </a:r>
             <a:r>
-              <a:rPr lang="fr-FR" dirty="0" err="1" smtClean="0"/>
+              <a:rPr lang="fr-FR" dirty="0" err="1"/>
               <a:t>Stallman</a:t>
             </a:r>
             <a:r>
-              <a:rPr lang="fr-FR" dirty="0" smtClean="0"/>
+              <a:rPr lang="fr-FR" dirty="0"/>
               <a:t> (Free Software </a:t>
             </a:r>
             <a:r>
-              <a:rPr lang="fr-FR" dirty="0" err="1" smtClean="0"/>
+              <a:rPr lang="fr-FR" dirty="0" err="1"/>
               <a:t>Foundation</a:t>
             </a:r>
             <a:r>
-              <a:rPr lang="fr-FR" dirty="0" smtClean="0"/>
+              <a:rPr lang="fr-FR" dirty="0"/>
               <a:t>)</a:t>
             </a:r>
           </a:p>
           <a:p>
             <a:r>
-              <a:rPr lang="fr-FR" dirty="0" smtClean="0"/>
+              <a:rPr lang="fr-FR" dirty="0"/>
               <a:t>1984 : 1st </a:t>
             </a:r>
             <a:r>
-              <a:rPr lang="fr-FR" dirty="0" err="1" smtClean="0"/>
+              <a:rPr lang="fr-FR" dirty="0" err="1"/>
               <a:t>edition</a:t>
             </a:r>
             <a:r>
-              <a:rPr lang="fr-FR" dirty="0" smtClean="0"/>
+              <a:rPr lang="fr-FR" dirty="0"/>
               <a:t> of </a:t>
             </a:r>
             <a:r>
-              <a:rPr lang="fr-FR" dirty="0" err="1" smtClean="0"/>
+              <a:rPr lang="fr-FR" dirty="0" err="1"/>
               <a:t>gcc</a:t>
             </a:r>
             <a:r>
-              <a:rPr lang="fr-FR" dirty="0" smtClean="0"/>
+              <a:rPr lang="fr-FR" dirty="0"/>
               <a:t>  : pascal</a:t>
             </a:r>
           </a:p>
           <a:p>
             <a:r>
-              <a:rPr lang="fr-FR" dirty="0" smtClean="0"/>
+              <a:rPr lang="fr-FR" dirty="0"/>
               <a:t>1986 : C</a:t>
             </a:r>
           </a:p>
           <a:p>
             <a:r>
-              <a:rPr lang="fr-FR" dirty="0" smtClean="0"/>
+              <a:rPr lang="fr-FR" dirty="0"/>
               <a:t>1987 : C++ by Michael </a:t>
             </a:r>
             <a:r>
-              <a:rPr lang="fr-FR" dirty="0" err="1" smtClean="0"/>
+              <a:rPr lang="fr-FR" dirty="0" err="1"/>
               <a:t>Tiemann</a:t>
             </a:r>
             <a:r>
-              <a:rPr lang="fr-FR" dirty="0" smtClean="0"/>
+              <a:rPr lang="fr-FR" dirty="0"/>
               <a:t>, g++</a:t>
             </a:r>
           </a:p>
           <a:p>
             <a:r>
-              <a:rPr lang="fr-FR" dirty="0" smtClean="0"/>
+              <a:rPr lang="fr-FR" dirty="0"/>
               <a:t>2019 : </a:t>
             </a:r>
             <a:r>
-              <a:rPr lang="fr-FR" dirty="0" err="1" smtClean="0"/>
+              <a:rPr lang="fr-FR" dirty="0" err="1"/>
               <a:t>gcc</a:t>
             </a:r>
             <a:r>
-              <a:rPr lang="fr-FR" dirty="0" smtClean="0"/>
+              <a:rPr lang="fr-FR" dirty="0"/>
               <a:t> 9.1</a:t>
             </a:r>
           </a:p>
           <a:p>
             <a:r>
-              <a:rPr lang="fr-FR" dirty="0" smtClean="0"/>
+              <a:rPr lang="fr-FR" dirty="0"/>
               <a:t>For </a:t>
             </a:r>
             <a:r>
-              <a:rPr lang="fr-FR" dirty="0" err="1" smtClean="0"/>
+              <a:rPr lang="fr-FR" dirty="0" err="1"/>
               <a:t>windows</a:t>
             </a:r>
             <a:r>
-              <a:rPr lang="fr-FR" dirty="0" smtClean="0"/>
+              <a:rPr lang="fr-FR" dirty="0"/>
               <a:t> : </a:t>
             </a:r>
             <a:r>
-              <a:rPr lang="fr-FR" dirty="0" err="1" smtClean="0"/>
+              <a:rPr lang="fr-FR" dirty="0" err="1"/>
               <a:t>MinGW</a:t>
             </a:r>
             <a:endParaRPr lang="fr-FR" dirty="0"/>
@@ -4044,8 +3997,12 @@
           <a:lstStyle/>
           <a:p>
             <a:r>
-              <a:rPr lang="fr-FR" dirty="0" smtClean="0"/>
-              <a:t>C++ Target</a:t>
+              <a:rPr lang="fr-FR" dirty="0"/>
+              <a:t>C++ </a:t>
+            </a:r>
+            <a:r>
+              <a:rPr lang="fr-FR" dirty="0" err="1"/>
+              <a:t>Resources</a:t>
             </a:r>
             <a:endParaRPr lang="fr-FR" dirty="0"/>
           </a:p>
@@ -4066,98 +4023,46 @@
           <a:bodyPr/>
           <a:lstStyle/>
           <a:p>
-            <a:r>
-              <a:rPr lang="fr-FR" dirty="0" smtClean="0"/>
-              <a:t>Operating </a:t>
-            </a:r>
-            <a:r>
-              <a:rPr lang="fr-FR" dirty="0" err="1" smtClean="0"/>
-              <a:t>systems</a:t>
-            </a:r>
-            <a:r>
-              <a:rPr lang="fr-FR" dirty="0" smtClean="0"/>
-              <a:t> : C </a:t>
-            </a:r>
-            <a:r>
-              <a:rPr lang="fr-FR" dirty="0" err="1" smtClean="0"/>
-              <a:t>with</a:t>
-            </a:r>
-            <a:r>
-              <a:rPr lang="fr-FR" dirty="0" smtClean="0"/>
-              <a:t> a few C++</a:t>
-            </a:r>
-          </a:p>
-          <a:p>
-            <a:r>
-              <a:rPr lang="fr-FR" dirty="0" err="1" smtClean="0"/>
-              <a:t>Graphical</a:t>
-            </a:r>
-            <a:r>
-              <a:rPr lang="fr-FR" dirty="0" smtClean="0"/>
-              <a:t> Interfaces</a:t>
-            </a:r>
-          </a:p>
-          <a:p>
-            <a:r>
-              <a:rPr lang="fr-FR" dirty="0" err="1" smtClean="0"/>
-              <a:t>Video</a:t>
-            </a:r>
-            <a:r>
-              <a:rPr lang="fr-FR" dirty="0" smtClean="0"/>
-              <a:t> </a:t>
-            </a:r>
-            <a:r>
-              <a:rPr lang="fr-FR" dirty="0" err="1" smtClean="0"/>
-              <a:t>Games</a:t>
-            </a:r>
-            <a:endParaRPr lang="fr-FR" dirty="0" smtClean="0"/>
-          </a:p>
-          <a:p>
-            <a:r>
-              <a:rPr lang="fr-FR" dirty="0" err="1" smtClean="0"/>
-              <a:t>Numerical</a:t>
-            </a:r>
-            <a:r>
-              <a:rPr lang="fr-FR" dirty="0" smtClean="0"/>
-              <a:t> </a:t>
-            </a:r>
-            <a:r>
-              <a:rPr lang="fr-FR" dirty="0" err="1" smtClean="0"/>
-              <a:t>Computing</a:t>
-            </a:r>
-            <a:endParaRPr lang="fr-FR" dirty="0" smtClean="0"/>
-          </a:p>
-          <a:p>
-            <a:r>
-              <a:rPr lang="fr-FR" dirty="0" smtClean="0"/>
-              <a:t>Java</a:t>
-            </a:r>
-          </a:p>
-          <a:p>
-            <a:r>
-              <a:rPr lang="fr-FR" dirty="0" smtClean="0"/>
-              <a:t>Python </a:t>
-            </a:r>
-            <a:r>
-              <a:rPr lang="fr-FR" dirty="0" err="1" smtClean="0"/>
-              <a:t>Interpreter</a:t>
-            </a:r>
-            <a:r>
-              <a:rPr lang="fr-FR" dirty="0" smtClean="0"/>
-              <a:t> and </a:t>
-            </a:r>
-            <a:r>
-              <a:rPr lang="fr-FR" dirty="0" err="1" smtClean="0"/>
-              <a:t>Libraries</a:t>
-            </a:r>
-            <a:endParaRPr lang="fr-FR" dirty="0" smtClean="0"/>
-          </a:p>
-          <a:p>
+            <a:pPr>
+              <a:buNone/>
+            </a:pPr>
+            <a:r>
+              <a:rPr lang="fr-FR" dirty="0"/>
+              <a:t>Web Sites :</a:t>
+            </a:r>
+          </a:p>
+          <a:p>
+            <a:r>
+              <a:rPr lang="fr-FR" dirty="0">
+                <a:hlinkClick r:id="rId2"/>
+              </a:rPr>
+              <a:t>http://www.cplusplus.com/reference/</a:t>
+            </a:r>
             <a:endParaRPr lang="fr-FR" dirty="0"/>
           </a:p>
+          <a:p>
+            <a:r>
+              <a:rPr lang="fr-FR" dirty="0">
+                <a:hlinkClick r:id="rId3"/>
+              </a:rPr>
+              <a:t>https://en.cppreference.com/w/</a:t>
+            </a:r>
+            <a:endParaRPr lang="fr-FR" dirty="0"/>
+          </a:p>
+          <a:p>
+            <a:pPr marL="0" indent="0">
+              <a:buNone/>
+            </a:pPr>
+            <a:endParaRPr lang="fr-FR" dirty="0"/>
+          </a:p>
         </p:txBody>
       </p:sp>
     </p:spTree>
+    <p:extLst>
+      <p:ext uri="{BB962C8B-B14F-4D97-AF65-F5344CB8AC3E}">
+        <p14:creationId xmlns:p14="http://schemas.microsoft.com/office/powerpoint/2010/main" val="2046117579"/>
+      </p:ext>
+    </p:extLst>
   </p:cSld>
   <p:clrMapOvr>
     <a:masterClrMapping/>
@@ -4198,10 +4103,162 @@
           <a:lstStyle/>
           <a:p>
             <a:r>
-              <a:rPr lang="fr-FR" dirty="0" smtClean="0"/>
+              <a:rPr lang="fr-FR" dirty="0"/>
+              <a:t>C++ Target</a:t>
+            </a:r>
+          </a:p>
+        </p:txBody>
+      </p:sp>
+      <p:sp>
+        <p:nvSpPr>
+          <p:cNvPr id="3" name="Espace réservé du contenu 2"/>
+          <p:cNvSpPr>
+            <a:spLocks noGrp="1"/>
+          </p:cNvSpPr>
+          <p:nvPr>
+            <p:ph idx="1"/>
+          </p:nvPr>
+        </p:nvSpPr>
+        <p:spPr/>
+        <p:txBody>
+          <a:bodyPr/>
+          <a:lstStyle/>
+          <a:p>
+            <a:r>
+              <a:rPr lang="fr-FR" dirty="0"/>
+              <a:t>Operating </a:t>
+            </a:r>
+            <a:r>
+              <a:rPr lang="fr-FR" dirty="0" err="1"/>
+              <a:t>systems</a:t>
+            </a:r>
+            <a:r>
+              <a:rPr lang="fr-FR" dirty="0"/>
+              <a:t> : C </a:t>
+            </a:r>
+            <a:r>
+              <a:rPr lang="fr-FR" dirty="0" err="1"/>
+              <a:t>with</a:t>
+            </a:r>
+            <a:r>
+              <a:rPr lang="fr-FR" dirty="0"/>
+              <a:t> a few C++</a:t>
+            </a:r>
+          </a:p>
+          <a:p>
+            <a:r>
+              <a:rPr lang="fr-FR" dirty="0" err="1"/>
+              <a:t>Graphical</a:t>
+            </a:r>
+            <a:r>
+              <a:rPr lang="fr-FR" dirty="0"/>
+              <a:t> Interfaces</a:t>
+            </a:r>
+          </a:p>
+          <a:p>
+            <a:r>
+              <a:rPr lang="fr-FR" dirty="0" err="1"/>
+              <a:t>Video</a:t>
+            </a:r>
+            <a:r>
+              <a:rPr lang="fr-FR" dirty="0"/>
+              <a:t> </a:t>
+            </a:r>
+            <a:r>
+              <a:rPr lang="fr-FR" dirty="0" err="1"/>
+              <a:t>Games</a:t>
+            </a:r>
+            <a:endParaRPr lang="fr-FR" dirty="0"/>
+          </a:p>
+          <a:p>
+            <a:r>
+              <a:rPr lang="fr-FR" dirty="0" err="1"/>
+              <a:t>Numerical</a:t>
+            </a:r>
+            <a:r>
+              <a:rPr lang="fr-FR" dirty="0"/>
+              <a:t> </a:t>
+            </a:r>
+            <a:r>
+              <a:rPr lang="fr-FR" dirty="0" err="1"/>
+              <a:t>Computing</a:t>
+            </a:r>
+            <a:endParaRPr lang="fr-FR" dirty="0"/>
+          </a:p>
+          <a:p>
+            <a:r>
+              <a:rPr lang="fr-FR" dirty="0"/>
+              <a:t>Java</a:t>
+            </a:r>
+          </a:p>
+          <a:p>
+            <a:r>
+              <a:rPr lang="fr-FR" dirty="0"/>
+              <a:t>Python </a:t>
+            </a:r>
+            <a:r>
+              <a:rPr lang="fr-FR" dirty="0" err="1"/>
+              <a:t>Interpreter</a:t>
+            </a:r>
+            <a:r>
+              <a:rPr lang="fr-FR" dirty="0"/>
+              <a:t> and </a:t>
+            </a:r>
+            <a:r>
+              <a:rPr lang="fr-FR" dirty="0" err="1"/>
+              <a:t>Libraries</a:t>
+            </a:r>
+            <a:endParaRPr lang="fr-FR" dirty="0"/>
+          </a:p>
+          <a:p>
+            <a:endParaRPr lang="fr-FR" dirty="0"/>
+          </a:p>
+        </p:txBody>
+      </p:sp>
+    </p:spTree>
+  </p:cSld>
+  <p:clrMapOvr>
+    <a:masterClrMapping/>
+  </p:clrMapOvr>
+</p:sld>
+</file>
+
+<file path=ppt/slides/slide9.xml><?xml version="1.0" encoding="utf-8"?>
+<p:sld xmlns:a="http://schemas.openxmlformats.org/drawingml/2006/main" xmlns:r="http://schemas.openxmlformats.org/officeDocument/2006/relationships" xmlns:p="http://schemas.openxmlformats.org/presentationml/2006/main">
+  <p:cSld>
+    <p:spTree>
+      <p:nvGrpSpPr>
+        <p:cNvPr id="1" name=""/>
+        <p:cNvGrpSpPr/>
+        <p:nvPr/>
+      </p:nvGrpSpPr>
+      <p:grpSpPr>
+        <a:xfrm>
+          <a:off x="0" y="0"/>
+          <a:ext cx="0" cy="0"/>
+          <a:chOff x="0" y="0"/>
+          <a:chExt cx="0" cy="0"/>
+        </a:xfrm>
+      </p:grpSpPr>
+      <p:sp>
+        <p:nvSpPr>
+          <p:cNvPr id="2" name="Titre 1"/>
+          <p:cNvSpPr>
+            <a:spLocks noGrp="1"/>
+          </p:cNvSpPr>
+          <p:nvPr>
+            <p:ph type="title"/>
+          </p:nvPr>
+        </p:nvSpPr>
+        <p:spPr/>
+        <p:txBody>
+          <a:bodyPr/>
+          <a:lstStyle/>
+          <a:p>
+            <a:r>
+              <a:rPr lang="fr-FR" dirty="0"/>
               <a:t>Hello World</a:t>
             </a:r>
-            <a:endParaRPr lang="fr-FR" dirty="0"/>
           </a:p>
         </p:txBody>
       </p:sp>
@@ -4226,23 +4283,23 @@
               <a:buNone/>
             </a:pPr>
             <a:r>
-              <a:rPr lang="fr-FR" dirty="0" smtClean="0"/>
+              <a:rPr lang="fr-FR" dirty="0"/>
               <a:t>#</a:t>
             </a:r>
             <a:r>
-              <a:rPr lang="fr-FR" dirty="0" err="1" smtClean="0"/>
+              <a:rPr lang="fr-FR" dirty="0" err="1"/>
               <a:t>include</a:t>
             </a:r>
             <a:r>
-              <a:rPr lang="fr-FR" dirty="0" smtClean="0"/>
+              <a:rPr lang="fr-FR" dirty="0"/>
               <a:t> &lt;</a:t>
             </a:r>
             <a:r>
-              <a:rPr lang="fr-FR" dirty="0" err="1" smtClean="0"/>
+              <a:rPr lang="fr-FR" dirty="0" err="1"/>
               <a:t>iostream</a:t>
             </a:r>
             <a:r>
-              <a:rPr lang="fr-FR" dirty="0" smtClean="0"/>
+              <a:rPr lang="fr-FR" dirty="0"/>
               <a:t>&gt;</a:t>
             </a:r>
           </a:p>
@@ -4258,30 +4315,26 @@
             </a:pPr>
             <a:r>
               <a:rPr lang="fr-FR" dirty="0" err="1"/>
-              <a:t>u</a:t>
-            </a:r>
-            <a:r>
-              <a:rPr lang="fr-FR" dirty="0" err="1" smtClean="0"/>
-              <a:t>sing</a:t>
-            </a:r>
-            <a:r>
-              <a:rPr lang="fr-FR" dirty="0" smtClean="0"/>
+              <a:t>using</a:t>
+            </a:r>
+            <a:r>
+              <a:rPr lang="fr-FR" dirty="0"/>
               <a:t> </a:t>
             </a:r>
             <a:r>
-              <a:rPr lang="fr-FR" dirty="0" err="1" smtClean="0"/>
+              <a:rPr lang="fr-FR" dirty="0" err="1"/>
               <a:t>namespace</a:t>
             </a:r>
             <a:r>
-              <a:rPr lang="fr-FR" dirty="0" smtClean="0"/>
+              <a:rPr lang="fr-FR" dirty="0"/>
               <a:t> </a:t>
             </a:r>
             <a:r>
-              <a:rPr lang="fr-FR" dirty="0" err="1" smtClean="0"/>
+              <a:rPr lang="fr-FR" dirty="0" err="1"/>
               <a:t>std</a:t>
             </a:r>
             <a:r>
-              <a:rPr lang="fr-FR" dirty="0" smtClean="0"/>
+              <a:rPr lang="fr-FR" dirty="0"/>
               <a:t>;</a:t>
             </a:r>
           </a:p>
@@ -4289,18 +4342,18 @@
             <a:pPr>
               <a:buNone/>
             </a:pPr>
-            <a:endParaRPr lang="fr-FR" dirty="0" smtClean="0"/>
+            <a:endParaRPr lang="fr-FR" dirty="0"/>
           </a:p>
           <a:p>
             <a:pPr>
               <a:buNone/>
             </a:pPr>
             <a:r>
-              <a:rPr lang="fr-FR" dirty="0" err="1" smtClean="0"/>
+              <a:rPr lang="fr-FR" dirty="0" err="1"/>
               <a:t>int</a:t>
             </a:r>
             <a:r>
-              <a:rPr lang="fr-FR" dirty="0" smtClean="0"/>
+              <a:rPr lang="fr-FR" dirty="0"/>
               <a:t> main() {</a:t>
             </a:r>
           </a:p>
@@ -4310,18 +4363,14 @@
             </a:pPr>
             <a:r>
               <a:rPr lang="fr-FR" dirty="0"/>
-              <a:t>	</a:t>
-            </a:r>
-            <a:r>
-              <a:rPr lang="fr-FR" dirty="0" smtClean="0"/>
-              <a:t>cout &lt;&lt; "Hello World !" &lt;&lt; </a:t>
-            </a:r>
-            <a:r>
-              <a:rPr lang="fr-FR" dirty="0" err="1" smtClean="0"/>
+              <a:t>	cout &lt;&lt; "Hello World !" &lt;&lt; </a:t>
+            </a:r>
+            <a:r>
+              <a:rPr lang="fr-FR" dirty="0" err="1"/>
               <a:t>endl</a:t>
             </a:r>
             <a:r>
-              <a:rPr lang="fr-FR" dirty="0" smtClean="0"/>
+              <a:rPr lang="fr-FR" dirty="0"/>
               <a:t>;</a:t>
             </a:r>
           </a:p>
@@ -4331,11 +4380,7 @@
             </a:pPr>
             <a:r>
               <a:rPr lang="fr-FR" dirty="0"/>
-              <a:t>	</a:t>
-            </a:r>
-            <a:r>
-              <a:rPr lang="fr-FR" dirty="0" smtClean="0"/>
-              <a:t>return 0;</a:t>
+              <a:t>	return 0;</a:t>
             </a:r>
           </a:p>
           <a:p>

</xml_diff>

<commit_message>
slides after day 1
</commit_message>
<xml_diff>
--- a/CPP.pptx
+++ b/CPP.pptx
@@ -14,6 +14,18 @@
     <p:sldId id="264" r:id="rId8"/>
     <p:sldId id="262" r:id="rId9"/>
     <p:sldId id="263" r:id="rId10"/>
+    <p:sldId id="265" r:id="rId11"/>
+    <p:sldId id="266" r:id="rId12"/>
+    <p:sldId id="267" r:id="rId13"/>
+    <p:sldId id="268" r:id="rId14"/>
+    <p:sldId id="269" r:id="rId15"/>
+    <p:sldId id="270" r:id="rId16"/>
+    <p:sldId id="271" r:id="rId17"/>
+    <p:sldId id="272" r:id="rId18"/>
+    <p:sldId id="273" r:id="rId19"/>
+    <p:sldId id="274" r:id="rId20"/>
+    <p:sldId id="275" r:id="rId21"/>
+    <p:sldId id="276" r:id="rId22"/>
   </p:sldIdLst>
   <p:sldSz cx="9144000" cy="6858000" type="screen4x3"/>
   <p:notesSz cx="6858000" cy="9144000"/>
@@ -3103,6 +3115,2180 @@
 </p:sld>
 </file>
 
+<file path=ppt/slides/slide10.xml><?xml version="1.0" encoding="utf-8"?>
+<p:sld xmlns:a="http://schemas.openxmlformats.org/drawingml/2006/main" xmlns:r="http://schemas.openxmlformats.org/officeDocument/2006/relationships" xmlns:p="http://schemas.openxmlformats.org/presentationml/2006/main">
+  <p:cSld>
+    <p:spTree>
+      <p:nvGrpSpPr>
+        <p:cNvPr id="1" name=""/>
+        <p:cNvGrpSpPr/>
+        <p:nvPr/>
+      </p:nvGrpSpPr>
+      <p:grpSpPr>
+        <a:xfrm>
+          <a:off x="0" y="0"/>
+          <a:ext cx="0" cy="0"/>
+          <a:chOff x="0" y="0"/>
+          <a:chExt cx="0" cy="0"/>
+        </a:xfrm>
+      </p:grpSpPr>
+      <p:sp>
+        <p:nvSpPr>
+          <p:cNvPr id="2" name="Titre 1">
+            <a:extLst>
+              <a:ext uri="{FF2B5EF4-FFF2-40B4-BE49-F238E27FC236}">
+                <a16:creationId xmlns:a16="http://schemas.microsoft.com/office/drawing/2014/main" id="{A110B818-8BD3-4F42-AA96-B8D886B8FE92}"/>
+              </a:ext>
+            </a:extLst>
+          </p:cNvPr>
+          <p:cNvSpPr>
+            <a:spLocks noGrp="1"/>
+          </p:cNvSpPr>
+          <p:nvPr>
+            <p:ph type="title"/>
+          </p:nvPr>
+        </p:nvSpPr>
+        <p:spPr/>
+        <p:txBody>
+          <a:bodyPr/>
+          <a:lstStyle/>
+          <a:p>
+            <a:r>
+              <a:rPr lang="fr-FR" dirty="0"/>
+              <a:t>Variable</a:t>
+            </a:r>
+          </a:p>
+        </p:txBody>
+      </p:sp>
+      <p:sp>
+        <p:nvSpPr>
+          <p:cNvPr id="3" name="Espace réservé du contenu 2">
+            <a:extLst>
+              <a:ext uri="{FF2B5EF4-FFF2-40B4-BE49-F238E27FC236}">
+                <a16:creationId xmlns:a16="http://schemas.microsoft.com/office/drawing/2014/main" id="{6EFF322C-6999-40E7-B70E-18D9E2C4A9A3}"/>
+              </a:ext>
+            </a:extLst>
+          </p:cNvPr>
+          <p:cNvSpPr>
+            <a:spLocks noGrp="1"/>
+          </p:cNvSpPr>
+          <p:nvPr>
+            <p:ph idx="1"/>
+          </p:nvPr>
+        </p:nvSpPr>
+        <p:spPr>
+          <a:xfrm>
+            <a:off x="457200" y="1600200"/>
+            <a:ext cx="8229600" cy="4983162"/>
+          </a:xfrm>
+        </p:spPr>
+        <p:txBody>
+          <a:bodyPr/>
+          <a:lstStyle/>
+          <a:p>
+            <a:r>
+              <a:rPr lang="fr-FR" dirty="0"/>
+              <a:t>Numériques</a:t>
+            </a:r>
+          </a:p>
+          <a:p>
+            <a:pPr marL="0" indent="0">
+              <a:buNone/>
+            </a:pPr>
+            <a:r>
+              <a:rPr lang="fr-FR" dirty="0"/>
+              <a:t>	Ex :   </a:t>
+            </a:r>
+            <a:r>
+              <a:rPr lang="fr-FR" dirty="0" err="1"/>
+              <a:t>int</a:t>
+            </a:r>
+            <a:r>
+              <a:rPr lang="fr-FR" dirty="0"/>
+              <a:t> prix;</a:t>
+            </a:r>
+          </a:p>
+          <a:p>
+            <a:pPr marL="0" indent="0">
+              <a:buNone/>
+            </a:pPr>
+            <a:r>
+              <a:rPr lang="fr-FR" dirty="0"/>
+              <a:t>		prix = 19;</a:t>
+            </a:r>
+          </a:p>
+          <a:p>
+            <a:pPr marL="0" indent="0">
+              <a:buNone/>
+            </a:pPr>
+            <a:r>
+              <a:rPr lang="fr-FR" dirty="0"/>
+              <a:t>	Machine : 00010011</a:t>
+            </a:r>
+          </a:p>
+          <a:p>
+            <a:pPr marL="0" indent="0">
+              <a:buNone/>
+            </a:pPr>
+            <a:r>
+              <a:rPr lang="fr-FR" dirty="0"/>
+              <a:t>	8 bits : 2^8=256</a:t>
+            </a:r>
+          </a:p>
+          <a:p>
+            <a:pPr marL="0" indent="0">
+              <a:buNone/>
+            </a:pPr>
+            <a:r>
+              <a:rPr lang="fr-FR" dirty="0"/>
+              <a:t>	=&gt; 0 à 255 ou -128 à 127</a:t>
+            </a:r>
+          </a:p>
+          <a:p>
+            <a:pPr marL="0" indent="0">
+              <a:buNone/>
+            </a:pPr>
+            <a:r>
+              <a:rPr lang="fr-FR" dirty="0"/>
+              <a:t>	32 bits : 2^32 "=" 4G</a:t>
+            </a:r>
+          </a:p>
+        </p:txBody>
+      </p:sp>
+      <p:cxnSp>
+        <p:nvCxnSpPr>
+          <p:cNvPr id="5" name="Connecteur droit avec flèche 4">
+            <a:extLst>
+              <a:ext uri="{FF2B5EF4-FFF2-40B4-BE49-F238E27FC236}">
+                <a16:creationId xmlns:a16="http://schemas.microsoft.com/office/drawing/2014/main" id="{46F60346-24AA-46D6-884D-D87C0C4DE399}"/>
+              </a:ext>
+            </a:extLst>
+          </p:cNvPr>
+          <p:cNvCxnSpPr/>
+          <p:nvPr/>
+        </p:nvCxnSpPr>
+        <p:spPr>
+          <a:xfrm>
+            <a:off x="971600" y="5949280"/>
+            <a:ext cx="7272808" cy="72008"/>
+          </a:xfrm>
+          <a:prstGeom prst="straightConnector1">
+            <a:avLst/>
+          </a:prstGeom>
+          <a:ln>
+            <a:tailEnd type="triangle"/>
+          </a:ln>
+        </p:spPr>
+        <p:style>
+          <a:lnRef idx="1">
+            <a:schemeClr val="accent2"/>
+          </a:lnRef>
+          <a:fillRef idx="0">
+            <a:schemeClr val="accent2"/>
+          </a:fillRef>
+          <a:effectRef idx="0">
+            <a:schemeClr val="accent2"/>
+          </a:effectRef>
+          <a:fontRef idx="minor">
+            <a:schemeClr val="tx1"/>
+          </a:fontRef>
+        </p:style>
+      </p:cxnSp>
+      <p:cxnSp>
+        <p:nvCxnSpPr>
+          <p:cNvPr id="7" name="Connecteur droit 6">
+            <a:extLst>
+              <a:ext uri="{FF2B5EF4-FFF2-40B4-BE49-F238E27FC236}">
+                <a16:creationId xmlns:a16="http://schemas.microsoft.com/office/drawing/2014/main" id="{6ACCD11F-3406-4DC8-9200-E03051D13D5E}"/>
+              </a:ext>
+            </a:extLst>
+          </p:cNvPr>
+          <p:cNvCxnSpPr/>
+          <p:nvPr/>
+        </p:nvCxnSpPr>
+        <p:spPr>
+          <a:xfrm>
+            <a:off x="1547664" y="5733256"/>
+            <a:ext cx="0" cy="504056"/>
+          </a:xfrm>
+          <a:prstGeom prst="line">
+            <a:avLst/>
+          </a:prstGeom>
+        </p:spPr>
+        <p:style>
+          <a:lnRef idx="1">
+            <a:schemeClr val="accent1"/>
+          </a:lnRef>
+          <a:fillRef idx="0">
+            <a:schemeClr val="accent1"/>
+          </a:fillRef>
+          <a:effectRef idx="0">
+            <a:schemeClr val="accent1"/>
+          </a:effectRef>
+          <a:fontRef idx="minor">
+            <a:schemeClr val="tx1"/>
+          </a:fontRef>
+        </p:style>
+      </p:cxnSp>
+      <p:cxnSp>
+        <p:nvCxnSpPr>
+          <p:cNvPr id="9" name="Connecteur droit 8">
+            <a:extLst>
+              <a:ext uri="{FF2B5EF4-FFF2-40B4-BE49-F238E27FC236}">
+                <a16:creationId xmlns:a16="http://schemas.microsoft.com/office/drawing/2014/main" id="{084E009D-E71A-45B4-AAD1-B4A6373DF0BE}"/>
+              </a:ext>
+            </a:extLst>
+          </p:cNvPr>
+          <p:cNvCxnSpPr/>
+          <p:nvPr/>
+        </p:nvCxnSpPr>
+        <p:spPr>
+          <a:xfrm>
+            <a:off x="7236296" y="5733256"/>
+            <a:ext cx="0" cy="504056"/>
+          </a:xfrm>
+          <a:prstGeom prst="line">
+            <a:avLst/>
+          </a:prstGeom>
+        </p:spPr>
+        <p:style>
+          <a:lnRef idx="1">
+            <a:schemeClr val="accent1"/>
+          </a:lnRef>
+          <a:fillRef idx="0">
+            <a:schemeClr val="accent1"/>
+          </a:fillRef>
+          <a:effectRef idx="0">
+            <a:schemeClr val="accent1"/>
+          </a:effectRef>
+          <a:fontRef idx="minor">
+            <a:schemeClr val="tx1"/>
+          </a:fontRef>
+        </p:style>
+      </p:cxnSp>
+      <p:sp>
+        <p:nvSpPr>
+          <p:cNvPr id="10" name="ZoneTexte 9">
+            <a:extLst>
+              <a:ext uri="{FF2B5EF4-FFF2-40B4-BE49-F238E27FC236}">
+                <a16:creationId xmlns:a16="http://schemas.microsoft.com/office/drawing/2014/main" id="{7E8FEB56-1AB2-45A4-943F-9D301AAD48DB}"/>
+              </a:ext>
+            </a:extLst>
+          </p:cNvPr>
+          <p:cNvSpPr txBox="1"/>
+          <p:nvPr/>
+        </p:nvSpPr>
+        <p:spPr>
+          <a:xfrm>
+            <a:off x="3923928" y="5589240"/>
+            <a:ext cx="648069" cy="369332"/>
+          </a:xfrm>
+          <a:prstGeom prst="rect">
+            <a:avLst/>
+          </a:prstGeom>
+          <a:noFill/>
+        </p:spPr>
+        <p:txBody>
+          <a:bodyPr wrap="square" rtlCol="0">
+            <a:spAutoFit/>
+          </a:bodyPr>
+          <a:lstStyle/>
+          <a:p>
+            <a:r>
+              <a:rPr lang="fr-FR" dirty="0"/>
+              <a:t>0</a:t>
+            </a:r>
+          </a:p>
+        </p:txBody>
+      </p:sp>
+    </p:spTree>
+    <p:extLst>
+      <p:ext uri="{BB962C8B-B14F-4D97-AF65-F5344CB8AC3E}">
+        <p14:creationId xmlns:p14="http://schemas.microsoft.com/office/powerpoint/2010/main" val="1189537024"/>
+      </p:ext>
+    </p:extLst>
+  </p:cSld>
+  <p:clrMapOvr>
+    <a:masterClrMapping/>
+  </p:clrMapOvr>
+</p:sld>
+</file>
+
+<file path=ppt/slides/slide11.xml><?xml version="1.0" encoding="utf-8"?>
+<p:sld xmlns:a="http://schemas.openxmlformats.org/drawingml/2006/main" xmlns:r="http://schemas.openxmlformats.org/officeDocument/2006/relationships" xmlns:p="http://schemas.openxmlformats.org/presentationml/2006/main">
+  <p:cSld>
+    <p:spTree>
+      <p:nvGrpSpPr>
+        <p:cNvPr id="1" name=""/>
+        <p:cNvGrpSpPr/>
+        <p:nvPr/>
+      </p:nvGrpSpPr>
+      <p:grpSpPr>
+        <a:xfrm>
+          <a:off x="0" y="0"/>
+          <a:ext cx="0" cy="0"/>
+          <a:chOff x="0" y="0"/>
+          <a:chExt cx="0" cy="0"/>
+        </a:xfrm>
+      </p:grpSpPr>
+      <p:sp>
+        <p:nvSpPr>
+          <p:cNvPr id="2" name="Titre 1">
+            <a:extLst>
+              <a:ext uri="{FF2B5EF4-FFF2-40B4-BE49-F238E27FC236}">
+                <a16:creationId xmlns:a16="http://schemas.microsoft.com/office/drawing/2014/main" id="{4D03178F-34DC-4AB6-9752-31B3A34F990E}"/>
+              </a:ext>
+            </a:extLst>
+          </p:cNvPr>
+          <p:cNvSpPr>
+            <a:spLocks noGrp="1"/>
+          </p:cNvSpPr>
+          <p:nvPr>
+            <p:ph type="title"/>
+          </p:nvPr>
+        </p:nvSpPr>
+        <p:spPr/>
+        <p:txBody>
+          <a:bodyPr/>
+          <a:lstStyle/>
+          <a:p>
+            <a:r>
+              <a:rPr lang="fr-FR" dirty="0" err="1"/>
+              <a:t>Integers</a:t>
+            </a:r>
+            <a:endParaRPr lang="fr-FR" dirty="0"/>
+          </a:p>
+        </p:txBody>
+      </p:sp>
+      <p:sp>
+        <p:nvSpPr>
+          <p:cNvPr id="3" name="Espace réservé du contenu 2">
+            <a:extLst>
+              <a:ext uri="{FF2B5EF4-FFF2-40B4-BE49-F238E27FC236}">
+                <a16:creationId xmlns:a16="http://schemas.microsoft.com/office/drawing/2014/main" id="{994AC5CA-D315-4CBF-95BC-D41DBF913F3E}"/>
+              </a:ext>
+            </a:extLst>
+          </p:cNvPr>
+          <p:cNvSpPr>
+            <a:spLocks noGrp="1"/>
+          </p:cNvSpPr>
+          <p:nvPr>
+            <p:ph idx="1"/>
+          </p:nvPr>
+        </p:nvSpPr>
+        <p:spPr/>
+        <p:txBody>
+          <a:bodyPr/>
+          <a:lstStyle/>
+          <a:p>
+            <a:r>
+              <a:rPr lang="fr-FR" dirty="0"/>
+              <a:t>short : 16</a:t>
+            </a:r>
+          </a:p>
+          <a:p>
+            <a:r>
+              <a:rPr lang="fr-FR" dirty="0" err="1"/>
+              <a:t>int</a:t>
+            </a:r>
+            <a:r>
+              <a:rPr lang="fr-FR" dirty="0"/>
+              <a:t> : 32</a:t>
+            </a:r>
+          </a:p>
+          <a:p>
+            <a:r>
+              <a:rPr lang="fr-FR" dirty="0"/>
+              <a:t>long : 32</a:t>
+            </a:r>
+          </a:p>
+          <a:p>
+            <a:r>
+              <a:rPr lang="fr-FR" dirty="0"/>
+              <a:t>long </a:t>
+            </a:r>
+            <a:r>
+              <a:rPr lang="fr-FR" dirty="0" err="1"/>
+              <a:t>long</a:t>
+            </a:r>
+            <a:r>
+              <a:rPr lang="fr-FR" dirty="0"/>
+              <a:t> : 64</a:t>
+            </a:r>
+          </a:p>
+          <a:p>
+            <a:r>
+              <a:rPr lang="fr-FR" dirty="0" err="1"/>
+              <a:t>signed</a:t>
+            </a:r>
+            <a:r>
+              <a:rPr lang="fr-FR" dirty="0"/>
+              <a:t> (default) /</a:t>
+            </a:r>
+            <a:r>
+              <a:rPr lang="fr-FR" dirty="0" err="1"/>
+              <a:t>unsigned</a:t>
+            </a:r>
+            <a:endParaRPr lang="fr-FR" dirty="0"/>
+          </a:p>
+          <a:p>
+            <a:r>
+              <a:rPr lang="fr-FR" dirty="0"/>
+              <a:t>int8, int16, int32, int64 </a:t>
+            </a:r>
+          </a:p>
+        </p:txBody>
+      </p:sp>
+    </p:spTree>
+    <p:extLst>
+      <p:ext uri="{BB962C8B-B14F-4D97-AF65-F5344CB8AC3E}">
+        <p14:creationId xmlns:p14="http://schemas.microsoft.com/office/powerpoint/2010/main" val="2903623376"/>
+      </p:ext>
+    </p:extLst>
+  </p:cSld>
+  <p:clrMapOvr>
+    <a:masterClrMapping/>
+  </p:clrMapOvr>
+</p:sld>
+</file>
+
+<file path=ppt/slides/slide12.xml><?xml version="1.0" encoding="utf-8"?>
+<p:sld xmlns:a="http://schemas.openxmlformats.org/drawingml/2006/main" xmlns:r="http://schemas.openxmlformats.org/officeDocument/2006/relationships" xmlns:p="http://schemas.openxmlformats.org/presentationml/2006/main">
+  <p:cSld>
+    <p:spTree>
+      <p:nvGrpSpPr>
+        <p:cNvPr id="1" name=""/>
+        <p:cNvGrpSpPr/>
+        <p:nvPr/>
+      </p:nvGrpSpPr>
+      <p:grpSpPr>
+        <a:xfrm>
+          <a:off x="0" y="0"/>
+          <a:ext cx="0" cy="0"/>
+          <a:chOff x="0" y="0"/>
+          <a:chExt cx="0" cy="0"/>
+        </a:xfrm>
+      </p:grpSpPr>
+      <p:sp>
+        <p:nvSpPr>
+          <p:cNvPr id="2" name="Titre 1">
+            <a:extLst>
+              <a:ext uri="{FF2B5EF4-FFF2-40B4-BE49-F238E27FC236}">
+                <a16:creationId xmlns:a16="http://schemas.microsoft.com/office/drawing/2014/main" id="{E16DAD9C-62FA-46BC-AC96-1E9DF13211C5}"/>
+              </a:ext>
+            </a:extLst>
+          </p:cNvPr>
+          <p:cNvSpPr>
+            <a:spLocks noGrp="1"/>
+          </p:cNvSpPr>
+          <p:nvPr>
+            <p:ph type="title"/>
+          </p:nvPr>
+        </p:nvSpPr>
+        <p:spPr/>
+        <p:txBody>
+          <a:bodyPr/>
+          <a:lstStyle/>
+          <a:p>
+            <a:r>
+              <a:rPr lang="fr-FR" dirty="0" err="1"/>
+              <a:t>Floats</a:t>
+            </a:r>
+            <a:endParaRPr lang="fr-FR" dirty="0"/>
+          </a:p>
+        </p:txBody>
+      </p:sp>
+      <p:sp>
+        <p:nvSpPr>
+          <p:cNvPr id="3" name="Espace réservé du contenu 2">
+            <a:extLst>
+              <a:ext uri="{FF2B5EF4-FFF2-40B4-BE49-F238E27FC236}">
+                <a16:creationId xmlns:a16="http://schemas.microsoft.com/office/drawing/2014/main" id="{8FF117C9-B279-41CE-8554-1BCFD9CC4EA6}"/>
+              </a:ext>
+            </a:extLst>
+          </p:cNvPr>
+          <p:cNvSpPr>
+            <a:spLocks noGrp="1"/>
+          </p:cNvSpPr>
+          <p:nvPr>
+            <p:ph idx="1"/>
+          </p:nvPr>
+        </p:nvSpPr>
+        <p:spPr/>
+        <p:txBody>
+          <a:bodyPr>
+            <a:normAutofit fontScale="92500" lnSpcReduction="20000"/>
+          </a:bodyPr>
+          <a:lstStyle/>
+          <a:p>
+            <a:r>
+              <a:rPr lang="fr-FR" dirty="0"/>
+              <a:t>double prix = 9.99</a:t>
+            </a:r>
+          </a:p>
+          <a:p>
+            <a:endParaRPr lang="fr-FR" dirty="0"/>
+          </a:p>
+          <a:p>
+            <a:endParaRPr lang="fr-FR" dirty="0"/>
+          </a:p>
+          <a:p>
+            <a:pPr marL="0" indent="0">
+              <a:buNone/>
+            </a:pPr>
+            <a:r>
+              <a:rPr lang="fr-FR" dirty="0"/>
+              <a:t>      S        E (8/11)           M (23/52)</a:t>
+            </a:r>
+          </a:p>
+          <a:p>
+            <a:r>
+              <a:rPr lang="fr-FR" dirty="0"/>
+              <a:t>double (64 bits)</a:t>
+            </a:r>
+          </a:p>
+          <a:p>
+            <a:r>
+              <a:rPr lang="fr-FR" dirty="0" err="1"/>
+              <a:t>float</a:t>
+            </a:r>
+            <a:r>
+              <a:rPr lang="fr-FR" dirty="0"/>
+              <a:t> (32 bits)</a:t>
+            </a:r>
+          </a:p>
+          <a:p>
+            <a:r>
+              <a:rPr lang="fr-FR" dirty="0"/>
+              <a:t>Cas spéciaux : +/- </a:t>
+            </a:r>
+            <a:r>
+              <a:rPr lang="fr-FR" dirty="0" err="1"/>
+              <a:t>inf</a:t>
+            </a:r>
+            <a:r>
+              <a:rPr lang="fr-FR" dirty="0"/>
+              <a:t>, nan</a:t>
+            </a:r>
+          </a:p>
+          <a:p>
+            <a:r>
+              <a:rPr lang="fr-FR" dirty="0"/>
+              <a:t>IEEE 754</a:t>
+            </a:r>
+          </a:p>
+          <a:p>
+            <a:r>
+              <a:rPr lang="fr-FR" dirty="0"/>
+              <a:t>0,1 (10) = 0,00011 (2)</a:t>
+            </a:r>
+          </a:p>
+        </p:txBody>
+      </p:sp>
+      <p:sp>
+        <p:nvSpPr>
+          <p:cNvPr id="4" name="Rectangle 3">
+            <a:extLst>
+              <a:ext uri="{FF2B5EF4-FFF2-40B4-BE49-F238E27FC236}">
+                <a16:creationId xmlns:a16="http://schemas.microsoft.com/office/drawing/2014/main" id="{B17C2A8D-DDA3-40EF-816B-F0081D925FA4}"/>
+              </a:ext>
+            </a:extLst>
+          </p:cNvPr>
+          <p:cNvSpPr/>
+          <p:nvPr/>
+        </p:nvSpPr>
+        <p:spPr>
+          <a:xfrm>
+            <a:off x="899592" y="2132856"/>
+            <a:ext cx="7200800" cy="792088"/>
+          </a:xfrm>
+          <a:prstGeom prst="rect">
+            <a:avLst/>
+          </a:prstGeom>
+        </p:spPr>
+        <p:style>
+          <a:lnRef idx="2">
+            <a:schemeClr val="accent1">
+              <a:shade val="50000"/>
+            </a:schemeClr>
+          </a:lnRef>
+          <a:fillRef idx="1">
+            <a:schemeClr val="accent1"/>
+          </a:fillRef>
+          <a:effectRef idx="0">
+            <a:schemeClr val="accent1"/>
+          </a:effectRef>
+          <a:fontRef idx="minor">
+            <a:schemeClr val="lt1"/>
+          </a:fontRef>
+        </p:style>
+        <p:txBody>
+          <a:bodyPr rtlCol="0" anchor="ctr"/>
+          <a:lstStyle/>
+          <a:p>
+            <a:pPr algn="ctr"/>
+            <a:endParaRPr lang="fr-FR"/>
+          </a:p>
+        </p:txBody>
+      </p:sp>
+      <p:cxnSp>
+        <p:nvCxnSpPr>
+          <p:cNvPr id="6" name="Connecteur droit 5">
+            <a:extLst>
+              <a:ext uri="{FF2B5EF4-FFF2-40B4-BE49-F238E27FC236}">
+                <a16:creationId xmlns:a16="http://schemas.microsoft.com/office/drawing/2014/main" id="{277D4FFD-BB1E-4D55-BC2C-8E0A737A1AED}"/>
+              </a:ext>
+            </a:extLst>
+          </p:cNvPr>
+          <p:cNvCxnSpPr/>
+          <p:nvPr/>
+        </p:nvCxnSpPr>
+        <p:spPr>
+          <a:xfrm>
+            <a:off x="1331640" y="2420888"/>
+            <a:ext cx="0" cy="792088"/>
+          </a:xfrm>
+          <a:prstGeom prst="line">
+            <a:avLst/>
+          </a:prstGeom>
+          <a:ln/>
+        </p:spPr>
+        <p:style>
+          <a:lnRef idx="1">
+            <a:schemeClr val="accent2"/>
+          </a:lnRef>
+          <a:fillRef idx="0">
+            <a:schemeClr val="accent2"/>
+          </a:fillRef>
+          <a:effectRef idx="0">
+            <a:schemeClr val="accent2"/>
+          </a:effectRef>
+          <a:fontRef idx="minor">
+            <a:schemeClr val="tx1"/>
+          </a:fontRef>
+        </p:style>
+      </p:cxnSp>
+      <p:cxnSp>
+        <p:nvCxnSpPr>
+          <p:cNvPr id="8" name="Connecteur droit 7">
+            <a:extLst>
+              <a:ext uri="{FF2B5EF4-FFF2-40B4-BE49-F238E27FC236}">
+                <a16:creationId xmlns:a16="http://schemas.microsoft.com/office/drawing/2014/main" id="{6DAD86E4-1BE4-452A-AC2E-AADAF9C0AC1B}"/>
+              </a:ext>
+            </a:extLst>
+          </p:cNvPr>
+          <p:cNvCxnSpPr/>
+          <p:nvPr/>
+        </p:nvCxnSpPr>
+        <p:spPr>
+          <a:xfrm>
+            <a:off x="3707904" y="2420888"/>
+            <a:ext cx="0" cy="792088"/>
+          </a:xfrm>
+          <a:prstGeom prst="line">
+            <a:avLst/>
+          </a:prstGeom>
+        </p:spPr>
+        <p:style>
+          <a:lnRef idx="1">
+            <a:schemeClr val="accent2"/>
+          </a:lnRef>
+          <a:fillRef idx="0">
+            <a:schemeClr val="accent2"/>
+          </a:fillRef>
+          <a:effectRef idx="0">
+            <a:schemeClr val="accent2"/>
+          </a:effectRef>
+          <a:fontRef idx="minor">
+            <a:schemeClr val="tx1"/>
+          </a:fontRef>
+        </p:style>
+      </p:cxnSp>
+      <p:sp>
+        <p:nvSpPr>
+          <p:cNvPr id="9" name="Ellipse 8">
+            <a:extLst>
+              <a:ext uri="{FF2B5EF4-FFF2-40B4-BE49-F238E27FC236}">
+                <a16:creationId xmlns:a16="http://schemas.microsoft.com/office/drawing/2014/main" id="{358D2BB2-8CF4-425C-8E35-9CF868C0D2F9}"/>
+              </a:ext>
+            </a:extLst>
+          </p:cNvPr>
+          <p:cNvSpPr/>
+          <p:nvPr/>
+        </p:nvSpPr>
+        <p:spPr>
+          <a:xfrm>
+            <a:off x="7884379" y="1916832"/>
+            <a:ext cx="576053" cy="1440161"/>
+          </a:xfrm>
+          <a:prstGeom prst="ellipse">
+            <a:avLst/>
+          </a:prstGeom>
+        </p:spPr>
+        <p:style>
+          <a:lnRef idx="2">
+            <a:schemeClr val="accent6">
+              <a:shade val="50000"/>
+            </a:schemeClr>
+          </a:lnRef>
+          <a:fillRef idx="1">
+            <a:schemeClr val="accent6"/>
+          </a:fillRef>
+          <a:effectRef idx="0">
+            <a:schemeClr val="accent6"/>
+          </a:effectRef>
+          <a:fontRef idx="minor">
+            <a:schemeClr val="lt1"/>
+          </a:fontRef>
+        </p:style>
+        <p:txBody>
+          <a:bodyPr rtlCol="0" anchor="ctr"/>
+          <a:lstStyle/>
+          <a:p>
+            <a:pPr algn="ctr"/>
+            <a:endParaRPr lang="fr-FR"/>
+          </a:p>
+        </p:txBody>
+      </p:sp>
+      <p:cxnSp>
+        <p:nvCxnSpPr>
+          <p:cNvPr id="11" name="Connecteur droit 10">
+            <a:extLst>
+              <a:ext uri="{FF2B5EF4-FFF2-40B4-BE49-F238E27FC236}">
+                <a16:creationId xmlns:a16="http://schemas.microsoft.com/office/drawing/2014/main" id="{B7FCEE08-8BDF-4067-BEA3-4B42701407DA}"/>
+              </a:ext>
+            </a:extLst>
+          </p:cNvPr>
+          <p:cNvCxnSpPr>
+            <a:cxnSpLocks/>
+          </p:cNvCxnSpPr>
+          <p:nvPr/>
+        </p:nvCxnSpPr>
+        <p:spPr>
+          <a:xfrm>
+            <a:off x="2924694" y="5661248"/>
+            <a:ext cx="720080" cy="0"/>
+          </a:xfrm>
+          <a:prstGeom prst="line">
+            <a:avLst/>
+          </a:prstGeom>
+          <a:ln w="28575"/>
+        </p:spPr>
+        <p:style>
+          <a:lnRef idx="1">
+            <a:schemeClr val="accent1"/>
+          </a:lnRef>
+          <a:fillRef idx="0">
+            <a:schemeClr val="accent1"/>
+          </a:fillRef>
+          <a:effectRef idx="0">
+            <a:schemeClr val="accent1"/>
+          </a:effectRef>
+          <a:fontRef idx="minor">
+            <a:schemeClr val="tx1"/>
+          </a:fontRef>
+        </p:style>
+      </p:cxnSp>
+    </p:spTree>
+    <p:extLst>
+      <p:ext uri="{BB962C8B-B14F-4D97-AF65-F5344CB8AC3E}">
+        <p14:creationId xmlns:p14="http://schemas.microsoft.com/office/powerpoint/2010/main" val="3173553153"/>
+      </p:ext>
+    </p:extLst>
+  </p:cSld>
+  <p:clrMapOvr>
+    <a:masterClrMapping/>
+  </p:clrMapOvr>
+</p:sld>
+</file>
+
+<file path=ppt/slides/slide13.xml><?xml version="1.0" encoding="utf-8"?>
+<p:sld xmlns:a="http://schemas.openxmlformats.org/drawingml/2006/main" xmlns:r="http://schemas.openxmlformats.org/officeDocument/2006/relationships" xmlns:p="http://schemas.openxmlformats.org/presentationml/2006/main">
+  <p:cSld>
+    <p:spTree>
+      <p:nvGrpSpPr>
+        <p:cNvPr id="1" name=""/>
+        <p:cNvGrpSpPr/>
+        <p:nvPr/>
+      </p:nvGrpSpPr>
+      <p:grpSpPr>
+        <a:xfrm>
+          <a:off x="0" y="0"/>
+          <a:ext cx="0" cy="0"/>
+          <a:chOff x="0" y="0"/>
+          <a:chExt cx="0" cy="0"/>
+        </a:xfrm>
+      </p:grpSpPr>
+      <p:sp>
+        <p:nvSpPr>
+          <p:cNvPr id="2" name="Titre 1">
+            <a:extLst>
+              <a:ext uri="{FF2B5EF4-FFF2-40B4-BE49-F238E27FC236}">
+                <a16:creationId xmlns:a16="http://schemas.microsoft.com/office/drawing/2014/main" id="{4D03178F-34DC-4AB6-9752-31B3A34F990E}"/>
+              </a:ext>
+            </a:extLst>
+          </p:cNvPr>
+          <p:cNvSpPr>
+            <a:spLocks noGrp="1"/>
+          </p:cNvSpPr>
+          <p:nvPr>
+            <p:ph type="title"/>
+          </p:nvPr>
+        </p:nvSpPr>
+        <p:spPr/>
+        <p:txBody>
+          <a:bodyPr/>
+          <a:lstStyle/>
+          <a:p>
+            <a:r>
+              <a:rPr lang="fr-FR" dirty="0" err="1"/>
+              <a:t>Operators</a:t>
+            </a:r>
+            <a:endParaRPr lang="fr-FR" dirty="0"/>
+          </a:p>
+        </p:txBody>
+      </p:sp>
+      <p:sp>
+        <p:nvSpPr>
+          <p:cNvPr id="3" name="Espace réservé du contenu 2">
+            <a:extLst>
+              <a:ext uri="{FF2B5EF4-FFF2-40B4-BE49-F238E27FC236}">
+                <a16:creationId xmlns:a16="http://schemas.microsoft.com/office/drawing/2014/main" id="{994AC5CA-D315-4CBF-95BC-D41DBF913F3E}"/>
+              </a:ext>
+            </a:extLst>
+          </p:cNvPr>
+          <p:cNvSpPr>
+            <a:spLocks noGrp="1"/>
+          </p:cNvSpPr>
+          <p:nvPr>
+            <p:ph idx="1"/>
+          </p:nvPr>
+        </p:nvSpPr>
+        <p:spPr>
+          <a:xfrm>
+            <a:off x="457200" y="1600200"/>
+            <a:ext cx="8229600" cy="4925144"/>
+          </a:xfrm>
+        </p:spPr>
+        <p:txBody>
+          <a:bodyPr>
+            <a:normAutofit fontScale="92500" lnSpcReduction="10000"/>
+          </a:bodyPr>
+          <a:lstStyle/>
+          <a:p>
+            <a:r>
+              <a:rPr lang="fr-FR" dirty="0"/>
+              <a:t>+, -, *, /, %</a:t>
+            </a:r>
+          </a:p>
+          <a:p>
+            <a:r>
+              <a:rPr lang="fr-FR" dirty="0"/>
+              <a:t>=, [ ]</a:t>
+            </a:r>
+          </a:p>
+          <a:p>
+            <a:r>
+              <a:rPr lang="fr-FR" dirty="0"/>
+              <a:t>++, --</a:t>
+            </a:r>
+          </a:p>
+          <a:p>
+            <a:r>
+              <a:rPr lang="fr-FR" dirty="0"/>
+              <a:t>+=, -=, *=, /=, %=</a:t>
+            </a:r>
+          </a:p>
+          <a:p>
+            <a:r>
+              <a:rPr lang="fr-FR" dirty="0"/>
+              <a:t>&lt;&lt;, &gt;&gt;</a:t>
+            </a:r>
+          </a:p>
+          <a:p>
+            <a:r>
+              <a:rPr lang="fr-FR" dirty="0"/>
+              <a:t>||, &amp;&amp;, !		(resp. or, and, not)</a:t>
+            </a:r>
+          </a:p>
+          <a:p>
+            <a:r>
+              <a:rPr lang="fr-FR" dirty="0"/>
+              <a:t>&lt;, &lt;=, &gt;, &gt;=, ==, !=</a:t>
+            </a:r>
+          </a:p>
+          <a:p>
+            <a:pPr marL="0" indent="0">
+              <a:buNone/>
+            </a:pPr>
+            <a:endParaRPr lang="fr-FR" dirty="0"/>
+          </a:p>
+          <a:p>
+            <a:r>
+              <a:rPr lang="fr-FR" dirty="0"/>
+              <a:t>|, &amp;, ^, ~ : </a:t>
+            </a:r>
+            <a:r>
+              <a:rPr lang="fr-FR" dirty="0" err="1"/>
+              <a:t>operator</a:t>
+            </a:r>
+            <a:r>
+              <a:rPr lang="fr-FR" dirty="0"/>
+              <a:t> </a:t>
+            </a:r>
+            <a:r>
+              <a:rPr lang="fr-FR" dirty="0" err="1"/>
+              <a:t>bitwise</a:t>
+            </a:r>
+            <a:endParaRPr lang="fr-FR" dirty="0"/>
+          </a:p>
+        </p:txBody>
+      </p:sp>
+    </p:spTree>
+    <p:extLst>
+      <p:ext uri="{BB962C8B-B14F-4D97-AF65-F5344CB8AC3E}">
+        <p14:creationId xmlns:p14="http://schemas.microsoft.com/office/powerpoint/2010/main" val="591341854"/>
+      </p:ext>
+    </p:extLst>
+  </p:cSld>
+  <p:clrMapOvr>
+    <a:masterClrMapping/>
+  </p:clrMapOvr>
+</p:sld>
+</file>
+
+<file path=ppt/slides/slide14.xml><?xml version="1.0" encoding="utf-8"?>
+<p:sld xmlns:a="http://schemas.openxmlformats.org/drawingml/2006/main" xmlns:r="http://schemas.openxmlformats.org/officeDocument/2006/relationships" xmlns:p="http://schemas.openxmlformats.org/presentationml/2006/main">
+  <p:cSld>
+    <p:spTree>
+      <p:nvGrpSpPr>
+        <p:cNvPr id="1" name=""/>
+        <p:cNvGrpSpPr/>
+        <p:nvPr/>
+      </p:nvGrpSpPr>
+      <p:grpSpPr>
+        <a:xfrm>
+          <a:off x="0" y="0"/>
+          <a:ext cx="0" cy="0"/>
+          <a:chOff x="0" y="0"/>
+          <a:chExt cx="0" cy="0"/>
+        </a:xfrm>
+      </p:grpSpPr>
+      <p:sp>
+        <p:nvSpPr>
+          <p:cNvPr id="2" name="Titre 1">
+            <a:extLst>
+              <a:ext uri="{FF2B5EF4-FFF2-40B4-BE49-F238E27FC236}">
+                <a16:creationId xmlns:a16="http://schemas.microsoft.com/office/drawing/2014/main" id="{5AF720DE-4CA8-4B06-A996-366781F7E86A}"/>
+              </a:ext>
+            </a:extLst>
+          </p:cNvPr>
+          <p:cNvSpPr>
+            <a:spLocks noGrp="1"/>
+          </p:cNvSpPr>
+          <p:nvPr>
+            <p:ph type="title"/>
+          </p:nvPr>
+        </p:nvSpPr>
+        <p:spPr/>
+        <p:txBody>
+          <a:bodyPr/>
+          <a:lstStyle/>
+          <a:p>
+            <a:r>
+              <a:rPr lang="fr-FR" dirty="0"/>
+              <a:t>Control flow</a:t>
+            </a:r>
+          </a:p>
+        </p:txBody>
+      </p:sp>
+      <p:sp>
+        <p:nvSpPr>
+          <p:cNvPr id="3" name="Espace réservé du contenu 2">
+            <a:extLst>
+              <a:ext uri="{FF2B5EF4-FFF2-40B4-BE49-F238E27FC236}">
+                <a16:creationId xmlns:a16="http://schemas.microsoft.com/office/drawing/2014/main" id="{A2C8D124-267F-4AC1-9A00-94896B85B7B1}"/>
+              </a:ext>
+            </a:extLst>
+          </p:cNvPr>
+          <p:cNvSpPr>
+            <a:spLocks noGrp="1"/>
+          </p:cNvSpPr>
+          <p:nvPr>
+            <p:ph idx="1"/>
+          </p:nvPr>
+        </p:nvSpPr>
+        <p:spPr/>
+        <p:txBody>
+          <a:bodyPr/>
+          <a:lstStyle/>
+          <a:p>
+            <a:r>
+              <a:rPr lang="fr-FR" dirty="0" err="1"/>
+              <a:t>Conditional</a:t>
+            </a:r>
+            <a:endParaRPr lang="fr-FR" dirty="0"/>
+          </a:p>
+          <a:p>
+            <a:pPr marL="0" indent="0">
+              <a:buNone/>
+            </a:pPr>
+            <a:r>
+              <a:rPr lang="fr-FR" dirty="0"/>
+              <a:t>	if (test)</a:t>
+            </a:r>
+          </a:p>
+          <a:p>
+            <a:pPr marL="0" indent="0">
+              <a:buNone/>
+            </a:pPr>
+            <a:r>
+              <a:rPr lang="fr-FR" dirty="0"/>
+              <a:t>	switch case</a:t>
+            </a:r>
+          </a:p>
+          <a:p>
+            <a:r>
+              <a:rPr lang="fr-FR" dirty="0" err="1"/>
+              <a:t>Loops</a:t>
+            </a:r>
+            <a:endParaRPr lang="fr-FR" dirty="0"/>
+          </a:p>
+          <a:p>
+            <a:pPr marL="0" indent="0">
+              <a:buNone/>
+            </a:pPr>
+            <a:r>
+              <a:rPr lang="fr-FR" dirty="0"/>
+              <a:t>	</a:t>
+            </a:r>
+            <a:r>
+              <a:rPr lang="fr-FR" dirty="0" err="1"/>
+              <a:t>while</a:t>
+            </a:r>
+            <a:r>
+              <a:rPr lang="fr-FR" dirty="0"/>
+              <a:t> (test)</a:t>
+            </a:r>
+          </a:p>
+          <a:p>
+            <a:pPr marL="0" indent="0">
+              <a:buNone/>
+            </a:pPr>
+            <a:r>
+              <a:rPr lang="fr-FR" dirty="0"/>
+              <a:t>	for ( init ; test; </a:t>
+            </a:r>
+            <a:r>
+              <a:rPr lang="fr-FR" dirty="0" err="1"/>
+              <a:t>incr</a:t>
+            </a:r>
+            <a:r>
+              <a:rPr lang="fr-FR" dirty="0"/>
+              <a:t>)</a:t>
+            </a:r>
+          </a:p>
+          <a:p>
+            <a:pPr marL="0" indent="0">
+              <a:buNone/>
+            </a:pPr>
+            <a:r>
+              <a:rPr lang="fr-FR" dirty="0"/>
+              <a:t>	for ( </a:t>
+            </a:r>
+            <a:r>
+              <a:rPr lang="fr-FR" dirty="0" err="1"/>
+              <a:t>element</a:t>
+            </a:r>
+            <a:r>
+              <a:rPr lang="fr-FR" dirty="0"/>
+              <a:t> : container )    </a:t>
+            </a:r>
+            <a:r>
+              <a:rPr lang="fr-FR" dirty="0">
+                <a:solidFill>
+                  <a:srgbClr val="00B050"/>
+                </a:solidFill>
+              </a:rPr>
+              <a:t>«</a:t>
+            </a:r>
+            <a:r>
+              <a:rPr lang="fr-FR" dirty="0"/>
+              <a:t> </a:t>
+            </a:r>
+            <a:r>
+              <a:rPr lang="fr-FR" dirty="0" err="1">
+                <a:solidFill>
+                  <a:srgbClr val="00B050"/>
+                </a:solidFill>
+              </a:rPr>
+              <a:t>foreach</a:t>
+            </a:r>
+            <a:r>
+              <a:rPr lang="fr-FR" dirty="0">
+                <a:solidFill>
+                  <a:srgbClr val="00B050"/>
+                </a:solidFill>
+              </a:rPr>
+              <a:t> »</a:t>
+            </a:r>
+          </a:p>
+        </p:txBody>
+      </p:sp>
+    </p:spTree>
+    <p:extLst>
+      <p:ext uri="{BB962C8B-B14F-4D97-AF65-F5344CB8AC3E}">
+        <p14:creationId xmlns:p14="http://schemas.microsoft.com/office/powerpoint/2010/main" val="3447104060"/>
+      </p:ext>
+    </p:extLst>
+  </p:cSld>
+  <p:clrMapOvr>
+    <a:masterClrMapping/>
+  </p:clrMapOvr>
+</p:sld>
+</file>
+
+<file path=ppt/slides/slide15.xml><?xml version="1.0" encoding="utf-8"?>
+<p:sld xmlns:a="http://schemas.openxmlformats.org/drawingml/2006/main" xmlns:r="http://schemas.openxmlformats.org/officeDocument/2006/relationships" xmlns:p="http://schemas.openxmlformats.org/presentationml/2006/main">
+  <p:cSld>
+    <p:spTree>
+      <p:nvGrpSpPr>
+        <p:cNvPr id="1" name=""/>
+        <p:cNvGrpSpPr/>
+        <p:nvPr/>
+      </p:nvGrpSpPr>
+      <p:grpSpPr>
+        <a:xfrm>
+          <a:off x="0" y="0"/>
+          <a:ext cx="0" cy="0"/>
+          <a:chOff x="0" y="0"/>
+          <a:chExt cx="0" cy="0"/>
+        </a:xfrm>
+      </p:grpSpPr>
+      <p:sp>
+        <p:nvSpPr>
+          <p:cNvPr id="2" name="Titre 1">
+            <a:extLst>
+              <a:ext uri="{FF2B5EF4-FFF2-40B4-BE49-F238E27FC236}">
+                <a16:creationId xmlns:a16="http://schemas.microsoft.com/office/drawing/2014/main" id="{C9248A66-1D0C-4C48-8AC8-2B47D1F8E97C}"/>
+              </a:ext>
+            </a:extLst>
+          </p:cNvPr>
+          <p:cNvSpPr>
+            <a:spLocks noGrp="1"/>
+          </p:cNvSpPr>
+          <p:nvPr>
+            <p:ph type="title"/>
+          </p:nvPr>
+        </p:nvSpPr>
+        <p:spPr/>
+        <p:txBody>
+          <a:bodyPr/>
+          <a:lstStyle/>
+          <a:p>
+            <a:endParaRPr lang="fr-FR"/>
+          </a:p>
+        </p:txBody>
+      </p:sp>
+      <p:sp>
+        <p:nvSpPr>
+          <p:cNvPr id="3" name="Espace réservé du contenu 2">
+            <a:extLst>
+              <a:ext uri="{FF2B5EF4-FFF2-40B4-BE49-F238E27FC236}">
+                <a16:creationId xmlns:a16="http://schemas.microsoft.com/office/drawing/2014/main" id="{C1731C1D-D440-4C8B-93C3-2C0A93BF25B6}"/>
+              </a:ext>
+            </a:extLst>
+          </p:cNvPr>
+          <p:cNvSpPr>
+            <a:spLocks noGrp="1"/>
+          </p:cNvSpPr>
+          <p:nvPr>
+            <p:ph idx="1"/>
+          </p:nvPr>
+        </p:nvSpPr>
+        <p:spPr/>
+        <p:txBody>
+          <a:bodyPr/>
+          <a:lstStyle/>
+          <a:p>
+            <a:pPr marL="0" indent="0">
+              <a:buNone/>
+            </a:pPr>
+            <a:r>
+              <a:rPr lang="fr-FR" dirty="0"/>
+              <a:t>a	b	reste</a:t>
+            </a:r>
+          </a:p>
+          <a:p>
+            <a:pPr marL="0" indent="0">
+              <a:buNone/>
+            </a:pPr>
+            <a:r>
+              <a:rPr lang="fr-FR" dirty="0"/>
+              <a:t>15	12	3</a:t>
+            </a:r>
+          </a:p>
+          <a:p>
+            <a:pPr marL="0" indent="0">
+              <a:buNone/>
+            </a:pPr>
+            <a:r>
+              <a:rPr lang="fr-FR" dirty="0"/>
+              <a:t>12	3	0</a:t>
+            </a:r>
+          </a:p>
+          <a:p>
+            <a:pPr marL="0" indent="0">
+              <a:buNone/>
+            </a:pPr>
+            <a:r>
+              <a:rPr lang="fr-FR" dirty="0">
+                <a:solidFill>
+                  <a:srgbClr val="00B050"/>
+                </a:solidFill>
+              </a:rPr>
+              <a:t>3</a:t>
+            </a:r>
+            <a:r>
+              <a:rPr lang="fr-FR" dirty="0"/>
+              <a:t>	0	</a:t>
+            </a:r>
+          </a:p>
+        </p:txBody>
+      </p:sp>
+    </p:spTree>
+    <p:extLst>
+      <p:ext uri="{BB962C8B-B14F-4D97-AF65-F5344CB8AC3E}">
+        <p14:creationId xmlns:p14="http://schemas.microsoft.com/office/powerpoint/2010/main" val="258098888"/>
+      </p:ext>
+    </p:extLst>
+  </p:cSld>
+  <p:clrMapOvr>
+    <a:masterClrMapping/>
+  </p:clrMapOvr>
+</p:sld>
+</file>
+
+<file path=ppt/slides/slide16.xml><?xml version="1.0" encoding="utf-8"?>
+<p:sld xmlns:a="http://schemas.openxmlformats.org/drawingml/2006/main" xmlns:r="http://schemas.openxmlformats.org/officeDocument/2006/relationships" xmlns:p="http://schemas.openxmlformats.org/presentationml/2006/main">
+  <p:cSld>
+    <p:spTree>
+      <p:nvGrpSpPr>
+        <p:cNvPr id="1" name=""/>
+        <p:cNvGrpSpPr/>
+        <p:nvPr/>
+      </p:nvGrpSpPr>
+      <p:grpSpPr>
+        <a:xfrm>
+          <a:off x="0" y="0"/>
+          <a:ext cx="0" cy="0"/>
+          <a:chOff x="0" y="0"/>
+          <a:chExt cx="0" cy="0"/>
+        </a:xfrm>
+      </p:grpSpPr>
+      <p:sp>
+        <p:nvSpPr>
+          <p:cNvPr id="2" name="Titre 1">
+            <a:extLst>
+              <a:ext uri="{FF2B5EF4-FFF2-40B4-BE49-F238E27FC236}">
+                <a16:creationId xmlns:a16="http://schemas.microsoft.com/office/drawing/2014/main" id="{8AA6F9E8-1145-4A07-941F-F6469975B7B0}"/>
+              </a:ext>
+            </a:extLst>
+          </p:cNvPr>
+          <p:cNvSpPr>
+            <a:spLocks noGrp="1"/>
+          </p:cNvSpPr>
+          <p:nvPr>
+            <p:ph type="title"/>
+          </p:nvPr>
+        </p:nvSpPr>
+        <p:spPr/>
+        <p:txBody>
+          <a:bodyPr/>
+          <a:lstStyle/>
+          <a:p>
+            <a:r>
+              <a:rPr lang="fr-FR" dirty="0"/>
+              <a:t>Tableau</a:t>
+            </a:r>
+          </a:p>
+        </p:txBody>
+      </p:sp>
+      <p:sp>
+        <p:nvSpPr>
+          <p:cNvPr id="4" name="ZoneTexte 3">
+            <a:extLst>
+              <a:ext uri="{FF2B5EF4-FFF2-40B4-BE49-F238E27FC236}">
+                <a16:creationId xmlns:a16="http://schemas.microsoft.com/office/drawing/2014/main" id="{DA8DD369-D860-495F-99F9-A7AA36643C24}"/>
+              </a:ext>
+            </a:extLst>
+          </p:cNvPr>
+          <p:cNvSpPr txBox="1"/>
+          <p:nvPr/>
+        </p:nvSpPr>
+        <p:spPr>
+          <a:xfrm>
+            <a:off x="1403648" y="2924944"/>
+            <a:ext cx="5328592" cy="369332"/>
+          </a:xfrm>
+          <a:prstGeom prst="rect">
+            <a:avLst/>
+          </a:prstGeom>
+          <a:noFill/>
+          <a:ln>
+            <a:solidFill>
+              <a:schemeClr val="tx2">
+                <a:lumMod val="60000"/>
+                <a:lumOff val="40000"/>
+              </a:schemeClr>
+            </a:solidFill>
+          </a:ln>
+        </p:spPr>
+        <p:txBody>
+          <a:bodyPr wrap="square" rtlCol="0">
+            <a:spAutoFit/>
+          </a:bodyPr>
+          <a:lstStyle/>
+          <a:p>
+            <a:r>
+              <a:rPr lang="fr-FR" dirty="0"/>
+              <a:t>4,5	4,6	7,8	63,1	45,7	45,1</a:t>
+            </a:r>
+          </a:p>
+        </p:txBody>
+      </p:sp>
+      <p:sp>
+        <p:nvSpPr>
+          <p:cNvPr id="6" name="ZoneTexte 5">
+            <a:extLst>
+              <a:ext uri="{FF2B5EF4-FFF2-40B4-BE49-F238E27FC236}">
+                <a16:creationId xmlns:a16="http://schemas.microsoft.com/office/drawing/2014/main" id="{397E52CE-EB42-443B-95D4-D6B7A6ED9DA1}"/>
+              </a:ext>
+            </a:extLst>
+          </p:cNvPr>
+          <p:cNvSpPr txBox="1"/>
+          <p:nvPr/>
+        </p:nvSpPr>
+        <p:spPr>
+          <a:xfrm>
+            <a:off x="1475656" y="2420888"/>
+            <a:ext cx="4968552" cy="369332"/>
+          </a:xfrm>
+          <a:prstGeom prst="rect">
+            <a:avLst/>
+          </a:prstGeom>
+          <a:noFill/>
+        </p:spPr>
+        <p:txBody>
+          <a:bodyPr wrap="square" rtlCol="0">
+            <a:spAutoFit/>
+          </a:bodyPr>
+          <a:lstStyle/>
+          <a:p>
+            <a:r>
+              <a:rPr lang="fr-FR" dirty="0"/>
+              <a:t>0	1	2	3	4	5</a:t>
+            </a:r>
+          </a:p>
+        </p:txBody>
+      </p:sp>
+    </p:spTree>
+    <p:extLst>
+      <p:ext uri="{BB962C8B-B14F-4D97-AF65-F5344CB8AC3E}">
+        <p14:creationId xmlns:p14="http://schemas.microsoft.com/office/powerpoint/2010/main" val="4138692267"/>
+      </p:ext>
+    </p:extLst>
+  </p:cSld>
+  <p:clrMapOvr>
+    <a:masterClrMapping/>
+  </p:clrMapOvr>
+</p:sld>
+</file>
+
+<file path=ppt/slides/slide17.xml><?xml version="1.0" encoding="utf-8"?>
+<p:sld xmlns:a="http://schemas.openxmlformats.org/drawingml/2006/main" xmlns:r="http://schemas.openxmlformats.org/officeDocument/2006/relationships" xmlns:p="http://schemas.openxmlformats.org/presentationml/2006/main">
+  <p:cSld>
+    <p:spTree>
+      <p:nvGrpSpPr>
+        <p:cNvPr id="1" name=""/>
+        <p:cNvGrpSpPr/>
+        <p:nvPr/>
+      </p:nvGrpSpPr>
+      <p:grpSpPr>
+        <a:xfrm>
+          <a:off x="0" y="0"/>
+          <a:ext cx="0" cy="0"/>
+          <a:chOff x="0" y="0"/>
+          <a:chExt cx="0" cy="0"/>
+        </a:xfrm>
+      </p:grpSpPr>
+      <p:sp>
+        <p:nvSpPr>
+          <p:cNvPr id="2" name="Titre 1">
+            <a:extLst>
+              <a:ext uri="{FF2B5EF4-FFF2-40B4-BE49-F238E27FC236}">
+                <a16:creationId xmlns:a16="http://schemas.microsoft.com/office/drawing/2014/main" id="{1D1AE128-BC3D-4680-A557-52AB5F166CC6}"/>
+              </a:ext>
+            </a:extLst>
+          </p:cNvPr>
+          <p:cNvSpPr>
+            <a:spLocks noGrp="1"/>
+          </p:cNvSpPr>
+          <p:nvPr>
+            <p:ph type="title"/>
+          </p:nvPr>
+        </p:nvSpPr>
+        <p:spPr/>
+        <p:txBody>
+          <a:bodyPr/>
+          <a:lstStyle/>
+          <a:p>
+            <a:r>
+              <a:rPr lang="fr-FR" dirty="0" err="1"/>
+              <a:t>Cost</a:t>
+            </a:r>
+            <a:r>
+              <a:rPr lang="fr-FR" dirty="0"/>
+              <a:t> of an </a:t>
+            </a:r>
+            <a:r>
+              <a:rPr lang="fr-FR" dirty="0" err="1"/>
+              <a:t>algorithm</a:t>
+            </a:r>
+            <a:endParaRPr lang="fr-FR" dirty="0"/>
+          </a:p>
+        </p:txBody>
+      </p:sp>
+      <p:sp>
+        <p:nvSpPr>
+          <p:cNvPr id="3" name="Espace réservé du contenu 2">
+            <a:extLst>
+              <a:ext uri="{FF2B5EF4-FFF2-40B4-BE49-F238E27FC236}">
+                <a16:creationId xmlns:a16="http://schemas.microsoft.com/office/drawing/2014/main" id="{3B183BAB-7258-4F0D-B18B-3F6D2146CF44}"/>
+              </a:ext>
+            </a:extLst>
+          </p:cNvPr>
+          <p:cNvSpPr>
+            <a:spLocks noGrp="1"/>
+          </p:cNvSpPr>
+          <p:nvPr>
+            <p:ph idx="1"/>
+          </p:nvPr>
+        </p:nvSpPr>
+        <p:spPr/>
+        <p:txBody>
+          <a:bodyPr>
+            <a:normAutofit lnSpcReduction="10000"/>
+          </a:bodyPr>
+          <a:lstStyle/>
+          <a:p>
+            <a:r>
+              <a:rPr lang="fr-FR" dirty="0"/>
+              <a:t>n = </a:t>
+            </a:r>
+            <a:r>
+              <a:rPr lang="fr-FR" dirty="0" err="1"/>
+              <a:t>number</a:t>
+            </a:r>
+            <a:r>
+              <a:rPr lang="fr-FR" dirty="0"/>
+              <a:t> of data</a:t>
+            </a:r>
+          </a:p>
+          <a:p>
+            <a:r>
+              <a:rPr lang="fr-FR" dirty="0" err="1"/>
+              <a:t>Cost</a:t>
+            </a:r>
+            <a:r>
+              <a:rPr lang="fr-FR" dirty="0"/>
+              <a:t> 1 : </a:t>
+            </a:r>
+            <a:r>
+              <a:rPr lang="fr-FR" dirty="0" err="1"/>
+              <a:t>number</a:t>
+            </a:r>
+            <a:r>
+              <a:rPr lang="fr-FR" dirty="0"/>
+              <a:t> of </a:t>
+            </a:r>
+            <a:r>
+              <a:rPr lang="fr-FR" dirty="0" err="1"/>
+              <a:t>operations</a:t>
+            </a:r>
+            <a:r>
+              <a:rPr lang="fr-FR" dirty="0"/>
+              <a:t> (time)</a:t>
+            </a:r>
+          </a:p>
+          <a:p>
+            <a:r>
+              <a:rPr lang="fr-FR" dirty="0" err="1"/>
+              <a:t>Cost</a:t>
+            </a:r>
+            <a:r>
+              <a:rPr lang="fr-FR" dirty="0"/>
+              <a:t> 2 : memory</a:t>
+            </a:r>
+          </a:p>
+          <a:p>
+            <a:r>
+              <a:rPr lang="fr-FR" dirty="0"/>
+              <a:t>Exemple :</a:t>
+            </a:r>
+          </a:p>
+          <a:p>
+            <a:pPr lvl="1"/>
+            <a:r>
+              <a:rPr lang="fr-FR" dirty="0"/>
+              <a:t>Recherche : n, log(n)</a:t>
+            </a:r>
+          </a:p>
+          <a:p>
+            <a:pPr lvl="1"/>
+            <a:r>
+              <a:rPr lang="fr-FR" dirty="0"/>
+              <a:t>Tri : n</a:t>
+            </a:r>
+            <a:r>
+              <a:rPr lang="fr-FR" baseline="30000" dirty="0"/>
+              <a:t>2</a:t>
+            </a:r>
+            <a:r>
+              <a:rPr lang="fr-FR" dirty="0"/>
+              <a:t>, </a:t>
+            </a:r>
+            <a:r>
+              <a:rPr lang="fr-FR" dirty="0" err="1"/>
+              <a:t>nlog</a:t>
+            </a:r>
+            <a:r>
+              <a:rPr lang="fr-FR" dirty="0"/>
+              <a:t>(n)</a:t>
+            </a:r>
+            <a:endParaRPr lang="fr-FR" baseline="30000" dirty="0"/>
+          </a:p>
+          <a:p>
+            <a:pPr lvl="1"/>
+            <a:endParaRPr lang="fr-FR" dirty="0"/>
+          </a:p>
+          <a:p>
+            <a:pPr lvl="1"/>
+            <a:endParaRPr lang="fr-FR" dirty="0"/>
+          </a:p>
+          <a:p>
+            <a:pPr lvl="1"/>
+            <a:r>
+              <a:rPr lang="fr-FR" dirty="0"/>
+              <a:t>log (1G) = log(2^30) = 30</a:t>
+            </a:r>
+          </a:p>
+        </p:txBody>
+      </p:sp>
+    </p:spTree>
+    <p:extLst>
+      <p:ext uri="{BB962C8B-B14F-4D97-AF65-F5344CB8AC3E}">
+        <p14:creationId xmlns:p14="http://schemas.microsoft.com/office/powerpoint/2010/main" val="4228676770"/>
+      </p:ext>
+    </p:extLst>
+  </p:cSld>
+  <p:clrMapOvr>
+    <a:masterClrMapping/>
+  </p:clrMapOvr>
+</p:sld>
+</file>
+
+<file path=ppt/slides/slide18.xml><?xml version="1.0" encoding="utf-8"?>
+<p:sld xmlns:a="http://schemas.openxmlformats.org/drawingml/2006/main" xmlns:r="http://schemas.openxmlformats.org/officeDocument/2006/relationships" xmlns:p="http://schemas.openxmlformats.org/presentationml/2006/main">
+  <p:cSld>
+    <p:spTree>
+      <p:nvGrpSpPr>
+        <p:cNvPr id="1" name=""/>
+        <p:cNvGrpSpPr/>
+        <p:nvPr/>
+      </p:nvGrpSpPr>
+      <p:grpSpPr>
+        <a:xfrm>
+          <a:off x="0" y="0"/>
+          <a:ext cx="0" cy="0"/>
+          <a:chOff x="0" y="0"/>
+          <a:chExt cx="0" cy="0"/>
+        </a:xfrm>
+      </p:grpSpPr>
+      <p:sp>
+        <p:nvSpPr>
+          <p:cNvPr id="2" name="Titre 1">
+            <a:extLst>
+              <a:ext uri="{FF2B5EF4-FFF2-40B4-BE49-F238E27FC236}">
+                <a16:creationId xmlns:a16="http://schemas.microsoft.com/office/drawing/2014/main" id="{8AA6F9E8-1145-4A07-941F-F6469975B7B0}"/>
+              </a:ext>
+            </a:extLst>
+          </p:cNvPr>
+          <p:cNvSpPr>
+            <a:spLocks noGrp="1"/>
+          </p:cNvSpPr>
+          <p:nvPr>
+            <p:ph type="title"/>
+          </p:nvPr>
+        </p:nvSpPr>
+        <p:spPr/>
+        <p:txBody>
+          <a:bodyPr/>
+          <a:lstStyle/>
+          <a:p>
+            <a:r>
+              <a:rPr lang="fr-FR" dirty="0"/>
+              <a:t>Recherche </a:t>
+            </a:r>
+            <a:r>
+              <a:rPr lang="fr-FR" dirty="0" err="1"/>
+              <a:t>Dicho</a:t>
+            </a:r>
+            <a:r>
+              <a:rPr lang="fr-FR" dirty="0"/>
+              <a:t> Tableau</a:t>
+            </a:r>
+          </a:p>
+        </p:txBody>
+      </p:sp>
+      <p:sp>
+        <p:nvSpPr>
+          <p:cNvPr id="4" name="ZoneTexte 3">
+            <a:extLst>
+              <a:ext uri="{FF2B5EF4-FFF2-40B4-BE49-F238E27FC236}">
+                <a16:creationId xmlns:a16="http://schemas.microsoft.com/office/drawing/2014/main" id="{DA8DD369-D860-495F-99F9-A7AA36643C24}"/>
+              </a:ext>
+            </a:extLst>
+          </p:cNvPr>
+          <p:cNvSpPr txBox="1"/>
+          <p:nvPr/>
+        </p:nvSpPr>
+        <p:spPr>
+          <a:xfrm>
+            <a:off x="1403648" y="2924944"/>
+            <a:ext cx="5328592" cy="369332"/>
+          </a:xfrm>
+          <a:prstGeom prst="rect">
+            <a:avLst/>
+          </a:prstGeom>
+          <a:noFill/>
+          <a:ln>
+            <a:solidFill>
+              <a:schemeClr val="tx2">
+                <a:lumMod val="60000"/>
+                <a:lumOff val="40000"/>
+              </a:schemeClr>
+            </a:solidFill>
+          </a:ln>
+        </p:spPr>
+        <p:txBody>
+          <a:bodyPr wrap="square" rtlCol="0">
+            <a:spAutoFit/>
+          </a:bodyPr>
+          <a:lstStyle/>
+          <a:p>
+            <a:r>
+              <a:rPr lang="fr-FR" dirty="0"/>
+              <a:t>4,5	4,6	7,8	</a:t>
+            </a:r>
+            <a:r>
+              <a:rPr lang="fr-FR" dirty="0">
+                <a:solidFill>
+                  <a:srgbClr val="00B050"/>
+                </a:solidFill>
+              </a:rPr>
+              <a:t> 45,1 </a:t>
+            </a:r>
+            <a:r>
+              <a:rPr lang="fr-FR" dirty="0"/>
+              <a:t>	 45,7 	 63,1</a:t>
+            </a:r>
+          </a:p>
+        </p:txBody>
+      </p:sp>
+      <p:sp>
+        <p:nvSpPr>
+          <p:cNvPr id="6" name="ZoneTexte 5">
+            <a:extLst>
+              <a:ext uri="{FF2B5EF4-FFF2-40B4-BE49-F238E27FC236}">
+                <a16:creationId xmlns:a16="http://schemas.microsoft.com/office/drawing/2014/main" id="{397E52CE-EB42-443B-95D4-D6B7A6ED9DA1}"/>
+              </a:ext>
+            </a:extLst>
+          </p:cNvPr>
+          <p:cNvSpPr txBox="1"/>
+          <p:nvPr/>
+        </p:nvSpPr>
+        <p:spPr>
+          <a:xfrm>
+            <a:off x="1475656" y="2420888"/>
+            <a:ext cx="6768752" cy="369332"/>
+          </a:xfrm>
+          <a:prstGeom prst="rect">
+            <a:avLst/>
+          </a:prstGeom>
+          <a:noFill/>
+        </p:spPr>
+        <p:txBody>
+          <a:bodyPr wrap="square" rtlCol="0">
+            <a:spAutoFit/>
+          </a:bodyPr>
+          <a:lstStyle/>
+          <a:p>
+            <a:r>
+              <a:rPr lang="fr-FR" dirty="0"/>
+              <a:t>0	1	2	3	4	5	6	</a:t>
+            </a:r>
+          </a:p>
+        </p:txBody>
+      </p:sp>
+      <p:sp>
+        <p:nvSpPr>
+          <p:cNvPr id="3" name="ZoneTexte 2">
+            <a:extLst>
+              <a:ext uri="{FF2B5EF4-FFF2-40B4-BE49-F238E27FC236}">
+                <a16:creationId xmlns:a16="http://schemas.microsoft.com/office/drawing/2014/main" id="{3964E99A-EC95-4483-A829-49C536FA1B01}"/>
+              </a:ext>
+            </a:extLst>
+          </p:cNvPr>
+          <p:cNvSpPr txBox="1"/>
+          <p:nvPr/>
+        </p:nvSpPr>
+        <p:spPr>
+          <a:xfrm>
+            <a:off x="1475656" y="1988840"/>
+            <a:ext cx="6192688" cy="369332"/>
+          </a:xfrm>
+          <a:prstGeom prst="rect">
+            <a:avLst/>
+          </a:prstGeom>
+          <a:noFill/>
+        </p:spPr>
+        <p:txBody>
+          <a:bodyPr wrap="square" rtlCol="0">
+            <a:spAutoFit/>
+          </a:bodyPr>
+          <a:lstStyle/>
+          <a:p>
+            <a:r>
+              <a:rPr lang="fr-FR" dirty="0"/>
+              <a:t>d			m			f</a:t>
+            </a:r>
+          </a:p>
+        </p:txBody>
+      </p:sp>
+      <p:sp>
+        <p:nvSpPr>
+          <p:cNvPr id="5" name="ZoneTexte 4">
+            <a:extLst>
+              <a:ext uri="{FF2B5EF4-FFF2-40B4-BE49-F238E27FC236}">
+                <a16:creationId xmlns:a16="http://schemas.microsoft.com/office/drawing/2014/main" id="{6BED40A5-BCC6-4C41-A0B8-D3E42EFB66EA}"/>
+              </a:ext>
+            </a:extLst>
+          </p:cNvPr>
+          <p:cNvSpPr txBox="1"/>
+          <p:nvPr/>
+        </p:nvSpPr>
+        <p:spPr>
+          <a:xfrm>
+            <a:off x="457200" y="2924944"/>
+            <a:ext cx="730424" cy="369332"/>
+          </a:xfrm>
+          <a:prstGeom prst="rect">
+            <a:avLst/>
+          </a:prstGeom>
+          <a:noFill/>
+        </p:spPr>
+        <p:txBody>
+          <a:bodyPr wrap="square" rtlCol="0">
+            <a:spAutoFit/>
+          </a:bodyPr>
+          <a:lstStyle/>
+          <a:p>
+            <a:r>
+              <a:rPr lang="fr-FR" dirty="0"/>
+              <a:t>tab</a:t>
+            </a:r>
+          </a:p>
+        </p:txBody>
+      </p:sp>
+      <p:sp>
+        <p:nvSpPr>
+          <p:cNvPr id="7" name="ZoneTexte 6">
+            <a:extLst>
+              <a:ext uri="{FF2B5EF4-FFF2-40B4-BE49-F238E27FC236}">
+                <a16:creationId xmlns:a16="http://schemas.microsoft.com/office/drawing/2014/main" id="{CB39AD5D-F212-4A1E-BEF5-E5F9C3A8056C}"/>
+              </a:ext>
+            </a:extLst>
+          </p:cNvPr>
+          <p:cNvSpPr txBox="1"/>
+          <p:nvPr/>
+        </p:nvSpPr>
+        <p:spPr>
+          <a:xfrm>
+            <a:off x="755576" y="4149080"/>
+            <a:ext cx="6768752" cy="2585323"/>
+          </a:xfrm>
+          <a:prstGeom prst="rect">
+            <a:avLst/>
+          </a:prstGeom>
+          <a:noFill/>
+        </p:spPr>
+        <p:txBody>
+          <a:bodyPr wrap="square" rtlCol="0">
+            <a:spAutoFit/>
+          </a:bodyPr>
+          <a:lstStyle/>
+          <a:p>
+            <a:r>
+              <a:rPr lang="fr-FR" dirty="0"/>
+              <a:t>Val recherchée : 45,7</a:t>
+            </a:r>
+          </a:p>
+          <a:p>
+            <a:r>
+              <a:rPr lang="fr-FR" dirty="0"/>
+              <a:t>A chaque étape :</a:t>
+            </a:r>
+          </a:p>
+          <a:p>
+            <a:r>
+              <a:rPr lang="fr-FR" dirty="0"/>
+              <a:t>	0 : milieu = (</a:t>
+            </a:r>
+            <a:r>
+              <a:rPr lang="fr-FR" dirty="0" err="1"/>
+              <a:t>debut</a:t>
+            </a:r>
+            <a:r>
+              <a:rPr lang="fr-FR" dirty="0"/>
+              <a:t> + fin) / 2</a:t>
+            </a:r>
+          </a:p>
+          <a:p>
+            <a:r>
+              <a:rPr lang="fr-FR" dirty="0"/>
+              <a:t>	1 : val recherchée = val du milieu ?    =&gt; trouvé : pos = milieu</a:t>
+            </a:r>
+          </a:p>
+          <a:p>
+            <a:r>
+              <a:rPr lang="fr-FR" dirty="0"/>
+              <a:t>	2 : val recherchée &gt; val du milieu ?    =&gt; on recommence sur 					la partie de droite</a:t>
+            </a:r>
+          </a:p>
+          <a:p>
+            <a:r>
+              <a:rPr lang="fr-FR" dirty="0"/>
+              <a:t>	3: val recherchée &lt; val du milieu  ? =&gt; on recommence sur 						la partie de gauche</a:t>
+            </a:r>
+          </a:p>
+          <a:p>
+            <a:r>
+              <a:rPr lang="fr-FR" dirty="0"/>
+              <a:t>Arrêt : trouvé  ou </a:t>
+            </a:r>
+            <a:r>
+              <a:rPr lang="fr-FR" dirty="0" err="1"/>
+              <a:t>debut</a:t>
+            </a:r>
+            <a:r>
+              <a:rPr lang="fr-FR" dirty="0"/>
+              <a:t> &gt;= fin</a:t>
+            </a:r>
+          </a:p>
+        </p:txBody>
+      </p:sp>
+    </p:spTree>
+    <p:extLst>
+      <p:ext uri="{BB962C8B-B14F-4D97-AF65-F5344CB8AC3E}">
+        <p14:creationId xmlns:p14="http://schemas.microsoft.com/office/powerpoint/2010/main" val="2707761696"/>
+      </p:ext>
+    </p:extLst>
+  </p:cSld>
+  <p:clrMapOvr>
+    <a:masterClrMapping/>
+  </p:clrMapOvr>
+</p:sld>
+</file>
+
+<file path=ppt/slides/slide19.xml><?xml version="1.0" encoding="utf-8"?>
+<p:sld xmlns:a="http://schemas.openxmlformats.org/drawingml/2006/main" xmlns:r="http://schemas.openxmlformats.org/officeDocument/2006/relationships" xmlns:p="http://schemas.openxmlformats.org/presentationml/2006/main">
+  <p:cSld>
+    <p:spTree>
+      <p:nvGrpSpPr>
+        <p:cNvPr id="1" name=""/>
+        <p:cNvGrpSpPr/>
+        <p:nvPr/>
+      </p:nvGrpSpPr>
+      <p:grpSpPr>
+        <a:xfrm>
+          <a:off x="0" y="0"/>
+          <a:ext cx="0" cy="0"/>
+          <a:chOff x="0" y="0"/>
+          <a:chExt cx="0" cy="0"/>
+        </a:xfrm>
+      </p:grpSpPr>
+      <p:sp>
+        <p:nvSpPr>
+          <p:cNvPr id="2" name="Titre 1">
+            <a:extLst>
+              <a:ext uri="{FF2B5EF4-FFF2-40B4-BE49-F238E27FC236}">
+                <a16:creationId xmlns:a16="http://schemas.microsoft.com/office/drawing/2014/main" id="{A52A7EE1-04A2-4509-A038-4DB8837DC9EE}"/>
+              </a:ext>
+            </a:extLst>
+          </p:cNvPr>
+          <p:cNvSpPr>
+            <a:spLocks noGrp="1"/>
+          </p:cNvSpPr>
+          <p:nvPr>
+            <p:ph type="title"/>
+          </p:nvPr>
+        </p:nvSpPr>
+        <p:spPr/>
+        <p:txBody>
+          <a:bodyPr/>
+          <a:lstStyle/>
+          <a:p>
+            <a:r>
+              <a:rPr lang="fr-FR" dirty="0" err="1"/>
+              <a:t>Functions</a:t>
+            </a:r>
+            <a:endParaRPr lang="fr-FR" dirty="0"/>
+          </a:p>
+        </p:txBody>
+      </p:sp>
+      <p:sp>
+        <p:nvSpPr>
+          <p:cNvPr id="3" name="Espace réservé du contenu 2">
+            <a:extLst>
+              <a:ext uri="{FF2B5EF4-FFF2-40B4-BE49-F238E27FC236}">
+                <a16:creationId xmlns:a16="http://schemas.microsoft.com/office/drawing/2014/main" id="{EC5236C0-2660-4ED6-B9EB-D967361B215F}"/>
+              </a:ext>
+            </a:extLst>
+          </p:cNvPr>
+          <p:cNvSpPr>
+            <a:spLocks noGrp="1"/>
+          </p:cNvSpPr>
+          <p:nvPr>
+            <p:ph idx="1"/>
+          </p:nvPr>
+        </p:nvSpPr>
+        <p:spPr>
+          <a:xfrm>
+            <a:off x="483827" y="1600200"/>
+            <a:ext cx="8229600" cy="4525963"/>
+          </a:xfrm>
+        </p:spPr>
+        <p:txBody>
+          <a:bodyPr/>
+          <a:lstStyle/>
+          <a:p>
+            <a:pPr marL="0" indent="0">
+              <a:buNone/>
+            </a:pPr>
+            <a:r>
+              <a:rPr lang="fr-FR" dirty="0" err="1"/>
+              <a:t>int</a:t>
+            </a:r>
+            <a:r>
+              <a:rPr lang="fr-FR" dirty="0"/>
+              <a:t> f(</a:t>
+            </a:r>
+            <a:r>
+              <a:rPr lang="fr-FR" dirty="0" err="1"/>
+              <a:t>int</a:t>
+            </a:r>
+            <a:r>
+              <a:rPr lang="fr-FR" dirty="0"/>
+              <a:t> x) {</a:t>
+            </a:r>
+          </a:p>
+          <a:p>
+            <a:pPr marL="0" indent="0">
+              <a:buNone/>
+            </a:pPr>
+            <a:r>
+              <a:rPr lang="fr-FR" dirty="0"/>
+              <a:t>	return x + 1;</a:t>
+            </a:r>
+          </a:p>
+          <a:p>
+            <a:pPr marL="0" indent="0">
+              <a:buNone/>
+            </a:pPr>
+            <a:r>
+              <a:rPr lang="fr-FR" dirty="0"/>
+              <a:t>}</a:t>
+            </a:r>
+          </a:p>
+        </p:txBody>
+      </p:sp>
+      <p:sp>
+        <p:nvSpPr>
+          <p:cNvPr id="4" name="ZoneTexte 3">
+            <a:extLst>
+              <a:ext uri="{FF2B5EF4-FFF2-40B4-BE49-F238E27FC236}">
+                <a16:creationId xmlns:a16="http://schemas.microsoft.com/office/drawing/2014/main" id="{5D19B0BD-64A1-4BBE-B239-F56C7A3A184B}"/>
+              </a:ext>
+            </a:extLst>
+          </p:cNvPr>
+          <p:cNvSpPr txBox="1"/>
+          <p:nvPr/>
+        </p:nvSpPr>
+        <p:spPr>
+          <a:xfrm>
+            <a:off x="3923928" y="3861048"/>
+            <a:ext cx="2736304" cy="369332"/>
+          </a:xfrm>
+          <a:prstGeom prst="rect">
+            <a:avLst/>
+          </a:prstGeom>
+          <a:noFill/>
+          <a:ln w="38100">
+            <a:solidFill>
+              <a:schemeClr val="tx1"/>
+            </a:solidFill>
+          </a:ln>
+        </p:spPr>
+        <p:txBody>
+          <a:bodyPr wrap="square" rtlCol="0">
+            <a:spAutoFit/>
+          </a:bodyPr>
+          <a:lstStyle/>
+          <a:p>
+            <a:r>
+              <a:rPr lang="fr-FR" dirty="0"/>
+              <a:t>	     f</a:t>
+            </a:r>
+          </a:p>
+        </p:txBody>
+      </p:sp>
+      <p:cxnSp>
+        <p:nvCxnSpPr>
+          <p:cNvPr id="6" name="Connecteur droit avec flèche 5">
+            <a:extLst>
+              <a:ext uri="{FF2B5EF4-FFF2-40B4-BE49-F238E27FC236}">
+                <a16:creationId xmlns:a16="http://schemas.microsoft.com/office/drawing/2014/main" id="{331852D7-29AD-40A9-BAFE-F9E2FEEB839D}"/>
+              </a:ext>
+            </a:extLst>
+          </p:cNvPr>
+          <p:cNvCxnSpPr/>
+          <p:nvPr/>
+        </p:nvCxnSpPr>
+        <p:spPr>
+          <a:xfrm>
+            <a:off x="2843808" y="4005064"/>
+            <a:ext cx="1008112" cy="0"/>
+          </a:xfrm>
+          <a:prstGeom prst="straightConnector1">
+            <a:avLst/>
+          </a:prstGeom>
+          <a:ln w="38100">
+            <a:tailEnd type="triangle"/>
+          </a:ln>
+        </p:spPr>
+        <p:style>
+          <a:lnRef idx="1">
+            <a:schemeClr val="accent1"/>
+          </a:lnRef>
+          <a:fillRef idx="0">
+            <a:schemeClr val="accent1"/>
+          </a:fillRef>
+          <a:effectRef idx="0">
+            <a:schemeClr val="accent1"/>
+          </a:effectRef>
+          <a:fontRef idx="minor">
+            <a:schemeClr val="tx1"/>
+          </a:fontRef>
+        </p:style>
+      </p:cxnSp>
+      <p:cxnSp>
+        <p:nvCxnSpPr>
+          <p:cNvPr id="7" name="Connecteur droit avec flèche 6">
+            <a:extLst>
+              <a:ext uri="{FF2B5EF4-FFF2-40B4-BE49-F238E27FC236}">
+                <a16:creationId xmlns:a16="http://schemas.microsoft.com/office/drawing/2014/main" id="{6515DF73-C4D6-4E04-8CAC-862779C95B02}"/>
+              </a:ext>
+            </a:extLst>
+          </p:cNvPr>
+          <p:cNvCxnSpPr/>
+          <p:nvPr/>
+        </p:nvCxnSpPr>
+        <p:spPr>
+          <a:xfrm>
+            <a:off x="6732240" y="4005064"/>
+            <a:ext cx="1008112" cy="0"/>
+          </a:xfrm>
+          <a:prstGeom prst="straightConnector1">
+            <a:avLst/>
+          </a:prstGeom>
+          <a:ln w="38100">
+            <a:tailEnd type="triangle"/>
+          </a:ln>
+        </p:spPr>
+        <p:style>
+          <a:lnRef idx="1">
+            <a:schemeClr val="accent1"/>
+          </a:lnRef>
+          <a:fillRef idx="0">
+            <a:schemeClr val="accent1"/>
+          </a:fillRef>
+          <a:effectRef idx="0">
+            <a:schemeClr val="accent1"/>
+          </a:effectRef>
+          <a:fontRef idx="minor">
+            <a:schemeClr val="tx1"/>
+          </a:fontRef>
+        </p:style>
+      </p:cxnSp>
+      <p:sp>
+        <p:nvSpPr>
+          <p:cNvPr id="8" name="ZoneTexte 7">
+            <a:extLst>
+              <a:ext uri="{FF2B5EF4-FFF2-40B4-BE49-F238E27FC236}">
+                <a16:creationId xmlns:a16="http://schemas.microsoft.com/office/drawing/2014/main" id="{EC359065-A813-45E3-A10E-785C2ED9CC50}"/>
+              </a:ext>
+            </a:extLst>
+          </p:cNvPr>
+          <p:cNvSpPr txBox="1"/>
+          <p:nvPr/>
+        </p:nvSpPr>
+        <p:spPr>
+          <a:xfrm>
+            <a:off x="3203848" y="3645024"/>
+            <a:ext cx="504056" cy="369332"/>
+          </a:xfrm>
+          <a:prstGeom prst="rect">
+            <a:avLst/>
+          </a:prstGeom>
+          <a:noFill/>
+        </p:spPr>
+        <p:txBody>
+          <a:bodyPr wrap="square" rtlCol="0">
+            <a:spAutoFit/>
+          </a:bodyPr>
+          <a:lstStyle/>
+          <a:p>
+            <a:r>
+              <a:rPr lang="fr-FR" dirty="0"/>
+              <a:t>x</a:t>
+            </a:r>
+          </a:p>
+        </p:txBody>
+      </p:sp>
+    </p:spTree>
+    <p:extLst>
+      <p:ext uri="{BB962C8B-B14F-4D97-AF65-F5344CB8AC3E}">
+        <p14:creationId xmlns:p14="http://schemas.microsoft.com/office/powerpoint/2010/main" val="3400676110"/>
+      </p:ext>
+    </p:extLst>
+  </p:cSld>
+  <p:clrMapOvr>
+    <a:masterClrMapping/>
+  </p:clrMapOvr>
+</p:sld>
+</file>
+
 <file path=ppt/slides/slide2.xml><?xml version="1.0" encoding="utf-8"?>
 <p:sld xmlns:a="http://schemas.openxmlformats.org/drawingml/2006/main" xmlns:r="http://schemas.openxmlformats.org/officeDocument/2006/relationships" xmlns:p="http://schemas.openxmlformats.org/presentationml/2006/main">
   <p:cSld>
@@ -3220,6 +5406,626 @@
         </p:txBody>
       </p:sp>
     </p:spTree>
+  </p:cSld>
+  <p:clrMapOvr>
+    <a:masterClrMapping/>
+  </p:clrMapOvr>
+</p:sld>
+</file>
+
+<file path=ppt/slides/slide20.xml><?xml version="1.0" encoding="utf-8"?>
+<p:sld xmlns:a="http://schemas.openxmlformats.org/drawingml/2006/main" xmlns:r="http://schemas.openxmlformats.org/officeDocument/2006/relationships" xmlns:p="http://schemas.openxmlformats.org/presentationml/2006/main">
+  <p:cSld>
+    <p:spTree>
+      <p:nvGrpSpPr>
+        <p:cNvPr id="1" name=""/>
+        <p:cNvGrpSpPr/>
+        <p:nvPr/>
+      </p:nvGrpSpPr>
+      <p:grpSpPr>
+        <a:xfrm>
+          <a:off x="0" y="0"/>
+          <a:ext cx="0" cy="0"/>
+          <a:chOff x="0" y="0"/>
+          <a:chExt cx="0" cy="0"/>
+        </a:xfrm>
+      </p:grpSpPr>
+      <p:sp>
+        <p:nvSpPr>
+          <p:cNvPr id="2" name="Titre 1">
+            <a:extLst>
+              <a:ext uri="{FF2B5EF4-FFF2-40B4-BE49-F238E27FC236}">
+                <a16:creationId xmlns:a16="http://schemas.microsoft.com/office/drawing/2014/main" id="{C53047C9-1B21-44CC-81EC-1B2A90CD2C40}"/>
+              </a:ext>
+            </a:extLst>
+          </p:cNvPr>
+          <p:cNvSpPr>
+            <a:spLocks noGrp="1"/>
+          </p:cNvSpPr>
+          <p:nvPr>
+            <p:ph type="title"/>
+          </p:nvPr>
+        </p:nvSpPr>
+        <p:spPr/>
+        <p:txBody>
+          <a:bodyPr/>
+          <a:lstStyle/>
+          <a:p>
+            <a:r>
+              <a:rPr lang="fr-FR" dirty="0"/>
+              <a:t>Stack</a:t>
+            </a:r>
+          </a:p>
+        </p:txBody>
+      </p:sp>
+      <p:sp>
+        <p:nvSpPr>
+          <p:cNvPr id="5" name="ZoneTexte 4">
+            <a:extLst>
+              <a:ext uri="{FF2B5EF4-FFF2-40B4-BE49-F238E27FC236}">
+                <a16:creationId xmlns:a16="http://schemas.microsoft.com/office/drawing/2014/main" id="{DD3587E1-8819-45E6-860E-C99366C9334D}"/>
+              </a:ext>
+            </a:extLst>
+          </p:cNvPr>
+          <p:cNvSpPr txBox="1"/>
+          <p:nvPr/>
+        </p:nvSpPr>
+        <p:spPr>
+          <a:xfrm>
+            <a:off x="5076056" y="1268760"/>
+            <a:ext cx="3610744" cy="5262979"/>
+          </a:xfrm>
+          <a:prstGeom prst="rect">
+            <a:avLst/>
+          </a:prstGeom>
+          <a:noFill/>
+          <a:ln>
+            <a:solidFill>
+              <a:srgbClr val="0070C0"/>
+            </a:solidFill>
+          </a:ln>
+        </p:spPr>
+        <p:txBody>
+          <a:bodyPr wrap="square" rtlCol="0">
+            <a:spAutoFit/>
+          </a:bodyPr>
+          <a:lstStyle/>
+          <a:p>
+            <a:pPr algn="ctr"/>
+            <a:endParaRPr lang="fr-FR" sz="2400" dirty="0"/>
+          </a:p>
+          <a:p>
+            <a:pPr algn="ctr"/>
+            <a:endParaRPr lang="fr-FR" sz="2400" dirty="0"/>
+          </a:p>
+          <a:p>
+            <a:pPr algn="ctr"/>
+            <a:endParaRPr lang="fr-FR" sz="2400" dirty="0"/>
+          </a:p>
+          <a:p>
+            <a:pPr algn="ctr"/>
+            <a:endParaRPr lang="fr-FR" sz="2400" dirty="0"/>
+          </a:p>
+          <a:p>
+            <a:pPr algn="ctr"/>
+            <a:endParaRPr lang="fr-FR" sz="2400" dirty="0"/>
+          </a:p>
+          <a:p>
+            <a:pPr algn="ctr"/>
+            <a:endParaRPr lang="fr-FR" sz="2400" dirty="0"/>
+          </a:p>
+          <a:p>
+            <a:pPr algn="ctr"/>
+            <a:r>
+              <a:rPr lang="fr-FR" sz="2400" dirty="0"/>
+              <a:t>?   3   0</a:t>
+            </a:r>
+          </a:p>
+          <a:p>
+            <a:pPr algn="ctr"/>
+            <a:r>
+              <a:rPr lang="fr-FR" sz="2400" dirty="0"/>
+              <a:t>15 12 3</a:t>
+            </a:r>
+          </a:p>
+          <a:p>
+            <a:pPr marL="457200" indent="-457200" algn="ctr">
+              <a:buAutoNum type="arabicPlain" startAt="12"/>
+            </a:pPr>
+            <a:r>
+              <a:rPr lang="fr-FR" sz="2400" dirty="0"/>
+              <a:t>3  0</a:t>
+            </a:r>
+          </a:p>
+          <a:p>
+            <a:pPr algn="ctr"/>
+            <a:r>
+              <a:rPr lang="fr-FR" sz="2400" dirty="0"/>
+              <a:t>3</a:t>
+            </a:r>
+          </a:p>
+          <a:p>
+            <a:pPr algn="ctr"/>
+            <a:r>
+              <a:rPr lang="fr-FR" sz="2400" dirty="0"/>
+              <a:t>?   3</a:t>
+            </a:r>
+          </a:p>
+          <a:p>
+            <a:pPr algn="ctr"/>
+            <a:r>
+              <a:rPr lang="fr-FR" sz="2400" dirty="0"/>
+              <a:t>15</a:t>
+            </a:r>
+          </a:p>
+          <a:p>
+            <a:pPr algn="ctr"/>
+            <a:r>
+              <a:rPr lang="fr-FR" sz="2400" dirty="0"/>
+              <a:t>12</a:t>
+            </a:r>
+          </a:p>
+          <a:p>
+            <a:endParaRPr lang="fr-FR" sz="2400" dirty="0"/>
+          </a:p>
+        </p:txBody>
+      </p:sp>
+      <p:sp>
+        <p:nvSpPr>
+          <p:cNvPr id="6" name="ZoneTexte 5">
+            <a:extLst>
+              <a:ext uri="{FF2B5EF4-FFF2-40B4-BE49-F238E27FC236}">
+                <a16:creationId xmlns:a16="http://schemas.microsoft.com/office/drawing/2014/main" id="{51DBC136-496C-470D-95C5-FE3620A9C5E6}"/>
+              </a:ext>
+            </a:extLst>
+          </p:cNvPr>
+          <p:cNvSpPr txBox="1"/>
+          <p:nvPr/>
+        </p:nvSpPr>
+        <p:spPr>
+          <a:xfrm>
+            <a:off x="4427984" y="1666280"/>
+            <a:ext cx="576064" cy="4801314"/>
+          </a:xfrm>
+          <a:prstGeom prst="rect">
+            <a:avLst/>
+          </a:prstGeom>
+          <a:noFill/>
+        </p:spPr>
+        <p:txBody>
+          <a:bodyPr wrap="square" rtlCol="0">
+            <a:spAutoFit/>
+          </a:bodyPr>
+          <a:lstStyle/>
+          <a:p>
+            <a:endParaRPr lang="fr-FR" sz="2400" dirty="0"/>
+          </a:p>
+          <a:p>
+            <a:endParaRPr lang="fr-FR" sz="2400" dirty="0"/>
+          </a:p>
+          <a:p>
+            <a:endParaRPr lang="fr-FR" sz="2400" dirty="0"/>
+          </a:p>
+          <a:p>
+            <a:endParaRPr lang="fr-FR" sz="2400" dirty="0"/>
+          </a:p>
+          <a:p>
+            <a:endParaRPr lang="fr-FR" sz="2400" dirty="0"/>
+          </a:p>
+          <a:p>
+            <a:r>
+              <a:rPr lang="fr-FR" sz="2400" dirty="0"/>
+              <a:t>R</a:t>
+            </a:r>
+          </a:p>
+          <a:p>
+            <a:r>
+              <a:rPr lang="fr-FR" sz="2400" dirty="0"/>
+              <a:t>A</a:t>
+            </a:r>
+          </a:p>
+          <a:p>
+            <a:r>
+              <a:rPr lang="fr-FR" sz="2400" dirty="0"/>
+              <a:t>B</a:t>
+            </a:r>
+          </a:p>
+          <a:p>
+            <a:endParaRPr lang="fr-FR" sz="2400" dirty="0"/>
+          </a:p>
+          <a:p>
+            <a:r>
+              <a:rPr lang="fr-FR" sz="2400" dirty="0"/>
+              <a:t>P</a:t>
+            </a:r>
+          </a:p>
+          <a:p>
+            <a:r>
+              <a:rPr lang="fr-FR" sz="2400" dirty="0"/>
+              <a:t>A</a:t>
+            </a:r>
+          </a:p>
+          <a:p>
+            <a:r>
+              <a:rPr lang="fr-FR" sz="2400" dirty="0"/>
+              <a:t>B</a:t>
+            </a:r>
+          </a:p>
+          <a:p>
+            <a:endParaRPr lang="fr-FR" dirty="0"/>
+          </a:p>
+        </p:txBody>
+      </p:sp>
+      <p:cxnSp>
+        <p:nvCxnSpPr>
+          <p:cNvPr id="8" name="Connecteur droit 7">
+            <a:extLst>
+              <a:ext uri="{FF2B5EF4-FFF2-40B4-BE49-F238E27FC236}">
+                <a16:creationId xmlns:a16="http://schemas.microsoft.com/office/drawing/2014/main" id="{C7BE9C59-CBB6-46CA-82B0-3D1597E05DA3}"/>
+              </a:ext>
+            </a:extLst>
+          </p:cNvPr>
+          <p:cNvCxnSpPr/>
+          <p:nvPr/>
+        </p:nvCxnSpPr>
+        <p:spPr>
+          <a:xfrm>
+            <a:off x="3923928" y="5013176"/>
+            <a:ext cx="5040560" cy="0"/>
+          </a:xfrm>
+          <a:prstGeom prst="line">
+            <a:avLst/>
+          </a:prstGeom>
+          <a:ln>
+            <a:prstDash val="dash"/>
+          </a:ln>
+        </p:spPr>
+        <p:style>
+          <a:lnRef idx="1">
+            <a:schemeClr val="accent1"/>
+          </a:lnRef>
+          <a:fillRef idx="0">
+            <a:schemeClr val="accent1"/>
+          </a:fillRef>
+          <a:effectRef idx="0">
+            <a:schemeClr val="accent1"/>
+          </a:effectRef>
+          <a:fontRef idx="minor">
+            <a:schemeClr val="tx1"/>
+          </a:fontRef>
+        </p:style>
+      </p:cxnSp>
+      <p:cxnSp>
+        <p:nvCxnSpPr>
+          <p:cNvPr id="10" name="Connecteur droit 9">
+            <a:extLst>
+              <a:ext uri="{FF2B5EF4-FFF2-40B4-BE49-F238E27FC236}">
+                <a16:creationId xmlns:a16="http://schemas.microsoft.com/office/drawing/2014/main" id="{0B6BE358-5C06-44C2-A917-F2E9A17C7224}"/>
+              </a:ext>
+            </a:extLst>
+          </p:cNvPr>
+          <p:cNvCxnSpPr/>
+          <p:nvPr/>
+        </p:nvCxnSpPr>
+        <p:spPr>
+          <a:xfrm>
+            <a:off x="6444208" y="3717032"/>
+            <a:ext cx="504056" cy="0"/>
+          </a:xfrm>
+          <a:prstGeom prst="line">
+            <a:avLst/>
+          </a:prstGeom>
+          <a:ln w="28575"/>
+        </p:spPr>
+        <p:style>
+          <a:lnRef idx="1">
+            <a:schemeClr val="accent2"/>
+          </a:lnRef>
+          <a:fillRef idx="0">
+            <a:schemeClr val="accent2"/>
+          </a:fillRef>
+          <a:effectRef idx="0">
+            <a:schemeClr val="accent2"/>
+          </a:effectRef>
+          <a:fontRef idx="minor">
+            <a:schemeClr val="tx1"/>
+          </a:fontRef>
+        </p:style>
+      </p:cxnSp>
+      <p:cxnSp>
+        <p:nvCxnSpPr>
+          <p:cNvPr id="11" name="Connecteur droit 10">
+            <a:extLst>
+              <a:ext uri="{FF2B5EF4-FFF2-40B4-BE49-F238E27FC236}">
+                <a16:creationId xmlns:a16="http://schemas.microsoft.com/office/drawing/2014/main" id="{FCECA72E-E937-47FC-B020-B2DAFE51C90E}"/>
+              </a:ext>
+            </a:extLst>
+          </p:cNvPr>
+          <p:cNvCxnSpPr/>
+          <p:nvPr/>
+        </p:nvCxnSpPr>
+        <p:spPr>
+          <a:xfrm>
+            <a:off x="6516216" y="4077072"/>
+            <a:ext cx="504056" cy="0"/>
+          </a:xfrm>
+          <a:prstGeom prst="line">
+            <a:avLst/>
+          </a:prstGeom>
+          <a:ln w="28575"/>
+        </p:spPr>
+        <p:style>
+          <a:lnRef idx="1">
+            <a:schemeClr val="accent2"/>
+          </a:lnRef>
+          <a:fillRef idx="0">
+            <a:schemeClr val="accent2"/>
+          </a:fillRef>
+          <a:effectRef idx="0">
+            <a:schemeClr val="accent2"/>
+          </a:effectRef>
+          <a:fontRef idx="minor">
+            <a:schemeClr val="tx1"/>
+          </a:fontRef>
+        </p:style>
+      </p:cxnSp>
+      <p:cxnSp>
+        <p:nvCxnSpPr>
+          <p:cNvPr id="12" name="Connecteur droit 11">
+            <a:extLst>
+              <a:ext uri="{FF2B5EF4-FFF2-40B4-BE49-F238E27FC236}">
+                <a16:creationId xmlns:a16="http://schemas.microsoft.com/office/drawing/2014/main" id="{1ADB73AD-55D5-4032-A03D-2FD98681A54C}"/>
+              </a:ext>
+            </a:extLst>
+          </p:cNvPr>
+          <p:cNvCxnSpPr/>
+          <p:nvPr/>
+        </p:nvCxnSpPr>
+        <p:spPr>
+          <a:xfrm>
+            <a:off x="6516216" y="4437112"/>
+            <a:ext cx="504056" cy="0"/>
+          </a:xfrm>
+          <a:prstGeom prst="line">
+            <a:avLst/>
+          </a:prstGeom>
+          <a:ln w="28575"/>
+        </p:spPr>
+        <p:style>
+          <a:lnRef idx="1">
+            <a:schemeClr val="accent2"/>
+          </a:lnRef>
+          <a:fillRef idx="0">
+            <a:schemeClr val="accent2"/>
+          </a:fillRef>
+          <a:effectRef idx="0">
+            <a:schemeClr val="accent2"/>
+          </a:effectRef>
+          <a:fontRef idx="minor">
+            <a:schemeClr val="tx1"/>
+          </a:fontRef>
+        </p:style>
+      </p:cxnSp>
+      <p:sp>
+        <p:nvSpPr>
+          <p:cNvPr id="13" name="ZoneTexte 12">
+            <a:extLst>
+              <a:ext uri="{FF2B5EF4-FFF2-40B4-BE49-F238E27FC236}">
+                <a16:creationId xmlns:a16="http://schemas.microsoft.com/office/drawing/2014/main" id="{7FD6E302-14B5-4C32-B4B4-66DAFBF08F24}"/>
+              </a:ext>
+            </a:extLst>
+          </p:cNvPr>
+          <p:cNvSpPr txBox="1"/>
+          <p:nvPr/>
+        </p:nvSpPr>
+        <p:spPr>
+          <a:xfrm>
+            <a:off x="1763688" y="5517232"/>
+            <a:ext cx="2160240" cy="369332"/>
+          </a:xfrm>
+          <a:prstGeom prst="rect">
+            <a:avLst/>
+          </a:prstGeom>
+          <a:noFill/>
+        </p:spPr>
+        <p:txBody>
+          <a:bodyPr wrap="square" rtlCol="0">
+            <a:spAutoFit/>
+          </a:bodyPr>
+          <a:lstStyle/>
+          <a:p>
+            <a:r>
+              <a:rPr lang="fr-FR" dirty="0" err="1"/>
+              <a:t>euclide</a:t>
+            </a:r>
+            <a:endParaRPr lang="fr-FR" dirty="0"/>
+          </a:p>
+        </p:txBody>
+      </p:sp>
+      <p:sp>
+        <p:nvSpPr>
+          <p:cNvPr id="14" name="ZoneTexte 13">
+            <a:extLst>
+              <a:ext uri="{FF2B5EF4-FFF2-40B4-BE49-F238E27FC236}">
+                <a16:creationId xmlns:a16="http://schemas.microsoft.com/office/drawing/2014/main" id="{30AE4806-D1D2-4C67-B2BB-F01F1762F2F9}"/>
+              </a:ext>
+            </a:extLst>
+          </p:cNvPr>
+          <p:cNvSpPr txBox="1"/>
+          <p:nvPr/>
+        </p:nvSpPr>
+        <p:spPr>
+          <a:xfrm>
+            <a:off x="1691680" y="4067780"/>
+            <a:ext cx="2160240" cy="369332"/>
+          </a:xfrm>
+          <a:prstGeom prst="rect">
+            <a:avLst/>
+          </a:prstGeom>
+          <a:noFill/>
+        </p:spPr>
+        <p:txBody>
+          <a:bodyPr wrap="square" rtlCol="0">
+            <a:spAutoFit/>
+          </a:bodyPr>
+          <a:lstStyle/>
+          <a:p>
+            <a:r>
+              <a:rPr lang="fr-FR" dirty="0"/>
+              <a:t>pgcd</a:t>
+            </a:r>
+          </a:p>
+        </p:txBody>
+      </p:sp>
+      <p:cxnSp>
+        <p:nvCxnSpPr>
+          <p:cNvPr id="15" name="Connecteur droit 14">
+            <a:extLst>
+              <a:ext uri="{FF2B5EF4-FFF2-40B4-BE49-F238E27FC236}">
+                <a16:creationId xmlns:a16="http://schemas.microsoft.com/office/drawing/2014/main" id="{3C1DBC75-530A-4CA1-BF07-0AF5BA738322}"/>
+              </a:ext>
+            </a:extLst>
+          </p:cNvPr>
+          <p:cNvCxnSpPr/>
+          <p:nvPr/>
+        </p:nvCxnSpPr>
+        <p:spPr>
+          <a:xfrm>
+            <a:off x="3923928" y="4581128"/>
+            <a:ext cx="5040560" cy="0"/>
+          </a:xfrm>
+          <a:prstGeom prst="line">
+            <a:avLst/>
+          </a:prstGeom>
+          <a:ln>
+            <a:prstDash val="dash"/>
+          </a:ln>
+        </p:spPr>
+        <p:style>
+          <a:lnRef idx="1">
+            <a:schemeClr val="accent1"/>
+          </a:lnRef>
+          <a:fillRef idx="0">
+            <a:schemeClr val="accent1"/>
+          </a:fillRef>
+          <a:effectRef idx="0">
+            <a:schemeClr val="accent1"/>
+          </a:effectRef>
+          <a:fontRef idx="minor">
+            <a:schemeClr val="tx1"/>
+          </a:fontRef>
+        </p:style>
+      </p:cxnSp>
+      <p:cxnSp>
+        <p:nvCxnSpPr>
+          <p:cNvPr id="16" name="Connecteur droit 15">
+            <a:extLst>
+              <a:ext uri="{FF2B5EF4-FFF2-40B4-BE49-F238E27FC236}">
+                <a16:creationId xmlns:a16="http://schemas.microsoft.com/office/drawing/2014/main" id="{9B0F8014-E8D2-4F91-82B0-C10AF5F255B6}"/>
+              </a:ext>
+            </a:extLst>
+          </p:cNvPr>
+          <p:cNvCxnSpPr/>
+          <p:nvPr/>
+        </p:nvCxnSpPr>
+        <p:spPr>
+          <a:xfrm>
+            <a:off x="6395881" y="5157192"/>
+            <a:ext cx="504056" cy="0"/>
+          </a:xfrm>
+          <a:prstGeom prst="line">
+            <a:avLst/>
+          </a:prstGeom>
+          <a:ln w="28575"/>
+        </p:spPr>
+        <p:style>
+          <a:lnRef idx="1">
+            <a:schemeClr val="accent2"/>
+          </a:lnRef>
+          <a:fillRef idx="0">
+            <a:schemeClr val="accent2"/>
+          </a:fillRef>
+          <a:effectRef idx="0">
+            <a:schemeClr val="accent2"/>
+          </a:effectRef>
+          <a:fontRef idx="minor">
+            <a:schemeClr val="tx1"/>
+          </a:fontRef>
+        </p:style>
+      </p:cxnSp>
+      <p:cxnSp>
+        <p:nvCxnSpPr>
+          <p:cNvPr id="17" name="Connecteur droit 16">
+            <a:extLst>
+              <a:ext uri="{FF2B5EF4-FFF2-40B4-BE49-F238E27FC236}">
+                <a16:creationId xmlns:a16="http://schemas.microsoft.com/office/drawing/2014/main" id="{46CB963B-C8E5-4B11-91A0-33FE97735B65}"/>
+              </a:ext>
+            </a:extLst>
+          </p:cNvPr>
+          <p:cNvCxnSpPr/>
+          <p:nvPr/>
+        </p:nvCxnSpPr>
+        <p:spPr>
+          <a:xfrm>
+            <a:off x="6629400" y="4797152"/>
+            <a:ext cx="504056" cy="0"/>
+          </a:xfrm>
+          <a:prstGeom prst="line">
+            <a:avLst/>
+          </a:prstGeom>
+          <a:ln w="28575"/>
+        </p:spPr>
+        <p:style>
+          <a:lnRef idx="1">
+            <a:schemeClr val="accent2"/>
+          </a:lnRef>
+          <a:fillRef idx="0">
+            <a:schemeClr val="accent2"/>
+          </a:fillRef>
+          <a:effectRef idx="0">
+            <a:schemeClr val="accent2"/>
+          </a:effectRef>
+          <a:fontRef idx="minor">
+            <a:schemeClr val="tx1"/>
+          </a:fontRef>
+        </p:style>
+      </p:cxnSp>
+    </p:spTree>
+    <p:extLst>
+      <p:ext uri="{BB962C8B-B14F-4D97-AF65-F5344CB8AC3E}">
+        <p14:creationId xmlns:p14="http://schemas.microsoft.com/office/powerpoint/2010/main" val="3594033880"/>
+      </p:ext>
+    </p:extLst>
+  </p:cSld>
+  <p:clrMapOvr>
+    <a:masterClrMapping/>
+  </p:clrMapOvr>
+</p:sld>
+</file>
+
+<file path=ppt/slides/slide21.xml><?xml version="1.0" encoding="utf-8"?>
+<p:sld xmlns:a="http://schemas.openxmlformats.org/drawingml/2006/main" xmlns:r="http://schemas.openxmlformats.org/officeDocument/2006/relationships" xmlns:p="http://schemas.openxmlformats.org/presentationml/2006/main">
+  <p:cSld>
+    <p:spTree>
+      <p:nvGrpSpPr>
+        <p:cNvPr id="1" name=""/>
+        <p:cNvGrpSpPr/>
+        <p:nvPr/>
+      </p:nvGrpSpPr>
+      <p:grpSpPr>
+        <a:xfrm>
+          <a:off x="0" y="0"/>
+          <a:ext cx="0" cy="0"/>
+          <a:chOff x="0" y="0"/>
+          <a:chExt cx="0" cy="0"/>
+        </a:xfrm>
+      </p:grpSpPr>
+    </p:spTree>
+    <p:extLst>
+      <p:ext uri="{BB962C8B-B14F-4D97-AF65-F5344CB8AC3E}">
+        <p14:creationId xmlns:p14="http://schemas.microsoft.com/office/powerpoint/2010/main" val="78720486"/>
+      </p:ext>
+    </p:extLst>
   </p:cSld>
   <p:clrMapOvr>
     <a:masterClrMapping/>
@@ -4194,7 +7000,7 @@
           <a:p>
             <a:r>
               <a:rPr lang="fr-FR" dirty="0"/>
-              <a:t>Python </a:t>
+              <a:t>Python/R </a:t>
             </a:r>
             <a:r>
               <a:rPr lang="fr-FR" dirty="0" err="1"/>
@@ -4211,7 +7017,10 @@
             <a:endParaRPr lang="fr-FR" dirty="0"/>
           </a:p>
           <a:p>
-            <a:endParaRPr lang="fr-FR" dirty="0"/>
+            <a:r>
+              <a:rPr lang="fr-FR" dirty="0"/>
+              <a:t>PostgreSQL</a:t>
+            </a:r>
           </a:p>
         </p:txBody>
       </p:sp>

</xml_diff>